<commit_message>
Mis à jour final de la presentation
</commit_message>
<xml_diff>
--- a/presentation/presentation_projet5_v01.pptx
+++ b/presentation/presentation_projet5_v01.pptx
@@ -852,7 +852,7 @@
       </p:grpSpPr>
       <p:sp>
         <p:nvSpPr>
-          <p:cNvPr id="136" name="Google Shape;136;g8edad6cf0c_0_7:notes"/>
+          <p:cNvPr id="136" name="Google Shape;136;g9434fdc6fb_0_151:notes"/>
           <p:cNvSpPr/>
           <p:nvPr>
             <p:ph idx="2" type="sldImg"/>
@@ -887,7 +887,7 @@
       </p:sp>
       <p:sp>
         <p:nvSpPr>
-          <p:cNvPr id="137" name="Google Shape;137;g8edad6cf0c_0_7:notes"/>
+          <p:cNvPr id="137" name="Google Shape;137;g9434fdc6fb_0_151:notes"/>
           <p:cNvSpPr txBox="1"/>
           <p:nvPr>
             <p:ph idx="1" type="body"/>
@@ -918,8 +918,7 @@
               <a:buNone/>
             </a:pPr>
             <a:r>
-              <a:rPr lang="fr"/>
-              <a:t>1.b) namenode secondaire et datanodes</a:t>
+              <a:t/>
             </a:r>
             <a:endParaRPr/>
           </a:p>
@@ -938,7 +937,7 @@
   <p:cSld>
     <p:spTree>
       <p:nvGrpSpPr>
-        <p:cNvPr id="141" name="Shape 141"/>
+        <p:cNvPr id="143" name="Shape 143"/>
         <p:cNvGrpSpPr/>
         <p:nvPr/>
       </p:nvGrpSpPr>
@@ -952,7 +951,7 @@
       </p:grpSpPr>
       <p:sp>
         <p:nvSpPr>
-          <p:cNvPr id="142" name="Google Shape;142;g8edad6cf0c_0_13:notes"/>
+          <p:cNvPr id="144" name="Google Shape;144;g8edad6cf0c_0_7:notes"/>
           <p:cNvSpPr/>
           <p:nvPr>
             <p:ph idx="2" type="sldImg"/>
@@ -987,7 +986,7 @@
       </p:sp>
       <p:sp>
         <p:nvSpPr>
-          <p:cNvPr id="143" name="Google Shape;143;g8edad6cf0c_0_13:notes"/>
+          <p:cNvPr id="145" name="Google Shape;145;g8edad6cf0c_0_7:notes"/>
           <p:cNvSpPr txBox="1"/>
           <p:nvPr>
             <p:ph idx="1" type="body"/>
@@ -1018,7 +1017,8 @@
               <a:buNone/>
             </a:pPr>
             <a:r>
-              <a:t/>
+              <a:rPr lang="fr"/>
+              <a:t>1.b) namenode secondaire et datanodes</a:t>
             </a:r>
             <a:endParaRPr/>
           </a:p>
@@ -1037,7 +1037,7 @@
   <p:cSld>
     <p:spTree>
       <p:nvGrpSpPr>
-        <p:cNvPr id="146" name="Shape 146"/>
+        <p:cNvPr id="149" name="Shape 149"/>
         <p:cNvGrpSpPr/>
         <p:nvPr/>
       </p:nvGrpSpPr>
@@ -1051,7 +1051,7 @@
       </p:grpSpPr>
       <p:sp>
         <p:nvSpPr>
-          <p:cNvPr id="147" name="Google Shape;147;g8c57b2bd4a_0_64:notes"/>
+          <p:cNvPr id="150" name="Google Shape;150;g8edad6cf0c_0_13:notes"/>
           <p:cNvSpPr/>
           <p:nvPr>
             <p:ph idx="2" type="sldImg"/>
@@ -1086,7 +1086,7 @@
       </p:sp>
       <p:sp>
         <p:nvSpPr>
-          <p:cNvPr id="148" name="Google Shape;148;g8c57b2bd4a_0_64:notes"/>
+          <p:cNvPr id="151" name="Google Shape;151;g8edad6cf0c_0_13:notes"/>
           <p:cNvSpPr txBox="1"/>
           <p:nvPr>
             <p:ph idx="1" type="body"/>
@@ -1136,7 +1136,7 @@
   <p:cSld>
     <p:spTree>
       <p:nvGrpSpPr>
-        <p:cNvPr id="164" name="Shape 164"/>
+        <p:cNvPr id="154" name="Shape 154"/>
         <p:cNvGrpSpPr/>
         <p:nvPr/>
       </p:nvGrpSpPr>
@@ -1150,7 +1150,7 @@
       </p:grpSpPr>
       <p:sp>
         <p:nvSpPr>
-          <p:cNvPr id="165" name="Google Shape;165;g9434fdc6fb_0_11:notes"/>
+          <p:cNvPr id="155" name="Google Shape;155;g8c57b2bd4a_0_64:notes"/>
           <p:cNvSpPr/>
           <p:nvPr>
             <p:ph idx="2" type="sldImg"/>
@@ -1185,7 +1185,7 @@
       </p:sp>
       <p:sp>
         <p:nvSpPr>
-          <p:cNvPr id="166" name="Google Shape;166;g9434fdc6fb_0_11:notes"/>
+          <p:cNvPr id="156" name="Google Shape;156;g8c57b2bd4a_0_64:notes"/>
           <p:cNvSpPr txBox="1"/>
           <p:nvPr>
             <p:ph idx="1" type="body"/>
@@ -1235,7 +1235,7 @@
   <p:cSld>
     <p:spTree>
       <p:nvGrpSpPr>
-        <p:cNvPr id="170" name="Shape 170"/>
+        <p:cNvPr id="172" name="Shape 172"/>
         <p:cNvGrpSpPr/>
         <p:nvPr/>
       </p:nvGrpSpPr>
@@ -1249,7 +1249,7 @@
       </p:grpSpPr>
       <p:sp>
         <p:nvSpPr>
-          <p:cNvPr id="171" name="Google Shape;171;g9434fdc6fb_0_57:notes"/>
+          <p:cNvPr id="173" name="Google Shape;173;g9434fdc6fb_0_11:notes"/>
           <p:cNvSpPr/>
           <p:nvPr>
             <p:ph idx="2" type="sldImg"/>
@@ -1284,7 +1284,7 @@
       </p:sp>
       <p:sp>
         <p:nvSpPr>
-          <p:cNvPr id="172" name="Google Shape;172;g9434fdc6fb_0_57:notes"/>
+          <p:cNvPr id="174" name="Google Shape;174;g9434fdc6fb_0_11:notes"/>
           <p:cNvSpPr txBox="1"/>
           <p:nvPr>
             <p:ph idx="1" type="body"/>
@@ -1334,7 +1334,7 @@
   <p:cSld>
     <p:spTree>
       <p:nvGrpSpPr>
-        <p:cNvPr id="191" name="Shape 191"/>
+        <p:cNvPr id="178" name="Shape 178"/>
         <p:cNvGrpSpPr/>
         <p:nvPr/>
       </p:nvGrpSpPr>
@@ -1348,7 +1348,7 @@
       </p:grpSpPr>
       <p:sp>
         <p:nvSpPr>
-          <p:cNvPr id="192" name="Google Shape;192;g9434fdc6fb_0_30:notes"/>
+          <p:cNvPr id="179" name="Google Shape;179;g9434fdc6fb_0_57:notes"/>
           <p:cNvSpPr/>
           <p:nvPr>
             <p:ph idx="2" type="sldImg"/>
@@ -1383,7 +1383,7 @@
       </p:sp>
       <p:sp>
         <p:nvSpPr>
-          <p:cNvPr id="193" name="Google Shape;193;g9434fdc6fb_0_30:notes"/>
+          <p:cNvPr id="180" name="Google Shape;180;g9434fdc6fb_0_57:notes"/>
           <p:cNvSpPr txBox="1"/>
           <p:nvPr>
             <p:ph idx="1" type="body"/>
@@ -1433,7 +1433,7 @@
   <p:cSld>
     <p:spTree>
       <p:nvGrpSpPr>
-        <p:cNvPr id="198" name="Shape 198"/>
+        <p:cNvPr id="199" name="Shape 199"/>
         <p:cNvGrpSpPr/>
         <p:nvPr/>
       </p:nvGrpSpPr>
@@ -1447,7 +1447,7 @@
       </p:grpSpPr>
       <p:sp>
         <p:nvSpPr>
-          <p:cNvPr id="199" name="Google Shape;199;g8bb7f8afe3_0_643:notes"/>
+          <p:cNvPr id="200" name="Google Shape;200;g9434fdc6fb_0_30:notes"/>
           <p:cNvSpPr/>
           <p:nvPr>
             <p:ph idx="2" type="sldImg"/>
@@ -1482,7 +1482,7 @@
       </p:sp>
       <p:sp>
         <p:nvSpPr>
-          <p:cNvPr id="200" name="Google Shape;200;g8bb7f8afe3_0_643:notes"/>
+          <p:cNvPr id="201" name="Google Shape;201;g9434fdc6fb_0_30:notes"/>
           <p:cNvSpPr txBox="1"/>
           <p:nvPr>
             <p:ph idx="1" type="body"/>
@@ -1532,7 +1532,7 @@
   <p:cSld>
     <p:spTree>
       <p:nvGrpSpPr>
-        <p:cNvPr id="220" name="Shape 220"/>
+        <p:cNvPr id="206" name="Shape 206"/>
         <p:cNvGrpSpPr/>
         <p:nvPr/>
       </p:nvGrpSpPr>
@@ -1546,7 +1546,7 @@
       </p:grpSpPr>
       <p:sp>
         <p:nvSpPr>
-          <p:cNvPr id="221" name="Google Shape;221;g9434fdc6fb_0_84:notes"/>
+          <p:cNvPr id="207" name="Google Shape;207;g8bb7f8afe3_0_643:notes"/>
           <p:cNvSpPr/>
           <p:nvPr>
             <p:ph idx="2" type="sldImg"/>
@@ -1581,7 +1581,7 @@
       </p:sp>
       <p:sp>
         <p:nvSpPr>
-          <p:cNvPr id="222" name="Google Shape;222;g9434fdc6fb_0_84:notes"/>
+          <p:cNvPr id="208" name="Google Shape;208;g8bb7f8afe3_0_643:notes"/>
           <p:cNvSpPr txBox="1"/>
           <p:nvPr>
             <p:ph idx="1" type="body"/>
@@ -1631,7 +1631,7 @@
   <p:cSld>
     <p:spTree>
       <p:nvGrpSpPr>
-        <p:cNvPr id="229" name="Shape 229"/>
+        <p:cNvPr id="228" name="Shape 228"/>
         <p:cNvGrpSpPr/>
         <p:nvPr/>
       </p:nvGrpSpPr>
@@ -1645,7 +1645,7 @@
       </p:grpSpPr>
       <p:sp>
         <p:nvSpPr>
-          <p:cNvPr id="230" name="Google Shape;230;g9434fdc6fb_0_90:notes"/>
+          <p:cNvPr id="229" name="Google Shape;229;g9434fdc6fb_0_84:notes"/>
           <p:cNvSpPr/>
           <p:nvPr>
             <p:ph idx="2" type="sldImg"/>
@@ -1680,7 +1680,7 @@
       </p:sp>
       <p:sp>
         <p:nvSpPr>
-          <p:cNvPr id="231" name="Google Shape;231;g9434fdc6fb_0_90:notes"/>
+          <p:cNvPr id="230" name="Google Shape;230;g9434fdc6fb_0_84:notes"/>
           <p:cNvSpPr txBox="1"/>
           <p:nvPr>
             <p:ph idx="1" type="body"/>
@@ -1730,7 +1730,7 @@
   <p:cSld>
     <p:spTree>
       <p:nvGrpSpPr>
-        <p:cNvPr id="235" name="Shape 235"/>
+        <p:cNvPr id="237" name="Shape 237"/>
         <p:cNvGrpSpPr/>
         <p:nvPr/>
       </p:nvGrpSpPr>
@@ -1744,7 +1744,7 @@
       </p:grpSpPr>
       <p:sp>
         <p:nvSpPr>
-          <p:cNvPr id="236" name="Google Shape;236;g9434fdc6fb_0_158:notes"/>
+          <p:cNvPr id="238" name="Google Shape;238;g9434fdc6fb_0_90:notes"/>
           <p:cNvSpPr/>
           <p:nvPr>
             <p:ph idx="2" type="sldImg"/>
@@ -1779,7 +1779,7 @@
       </p:sp>
       <p:sp>
         <p:nvSpPr>
-          <p:cNvPr id="237" name="Google Shape;237;g9434fdc6fb_0_158:notes"/>
+          <p:cNvPr id="239" name="Google Shape;239;g9434fdc6fb_0_90:notes"/>
           <p:cNvSpPr txBox="1"/>
           <p:nvPr>
             <p:ph idx="1" type="body"/>
@@ -1928,7 +1928,7 @@
   <p:cSld>
     <p:spTree>
       <p:nvGrpSpPr>
-        <p:cNvPr id="242" name="Shape 242"/>
+        <p:cNvPr id="243" name="Shape 243"/>
         <p:cNvGrpSpPr/>
         <p:nvPr/>
       </p:nvGrpSpPr>
@@ -1942,7 +1942,7 @@
       </p:grpSpPr>
       <p:sp>
         <p:nvSpPr>
-          <p:cNvPr id="243" name="Google Shape;243;g9434fdc6fb_0_176:notes"/>
+          <p:cNvPr id="244" name="Google Shape;244;g9434fdc6fb_0_158:notes"/>
           <p:cNvSpPr/>
           <p:nvPr>
             <p:ph idx="2" type="sldImg"/>
@@ -1977,7 +1977,7 @@
       </p:sp>
       <p:sp>
         <p:nvSpPr>
-          <p:cNvPr id="244" name="Google Shape;244;g9434fdc6fb_0_176:notes"/>
+          <p:cNvPr id="245" name="Google Shape;245;g9434fdc6fb_0_158:notes"/>
           <p:cNvSpPr txBox="1"/>
           <p:nvPr>
             <p:ph idx="1" type="body"/>
@@ -2027,7 +2027,7 @@
   <p:cSld>
     <p:spTree>
       <p:nvGrpSpPr>
-        <p:cNvPr id="265" name="Shape 265"/>
+        <p:cNvPr id="250" name="Shape 250"/>
         <p:cNvGrpSpPr/>
         <p:nvPr/>
       </p:nvGrpSpPr>
@@ -2041,7 +2041,7 @@
       </p:grpSpPr>
       <p:sp>
         <p:nvSpPr>
-          <p:cNvPr id="266" name="Google Shape;266;g9434fdc6fb_0_151:notes"/>
+          <p:cNvPr id="251" name="Google Shape;251;g9434fdc6fb_0_176:notes"/>
           <p:cNvSpPr/>
           <p:nvPr>
             <p:ph idx="2" type="sldImg"/>
@@ -2076,7 +2076,7 @@
       </p:sp>
       <p:sp>
         <p:nvSpPr>
-          <p:cNvPr id="267" name="Google Shape;267;g9434fdc6fb_0_151:notes"/>
+          <p:cNvPr id="252" name="Google Shape;252;g9434fdc6fb_0_176:notes"/>
           <p:cNvSpPr txBox="1"/>
           <p:nvPr>
             <p:ph idx="1" type="body"/>
@@ -3724,7 +3724,7 @@
       </p:grpSpPr>
       <p:sp>
         <p:nvSpPr>
-          <p:cNvPr id="370" name="Google Shape;370;g8edad6cf0c_0_18:notes"/>
+          <p:cNvPr id="370" name="Google Shape;370;g9434fdc6fb_0_0:notes"/>
           <p:cNvSpPr/>
           <p:nvPr>
             <p:ph idx="2" type="sldImg"/>
@@ -3759,7 +3759,7 @@
       </p:sp>
       <p:sp>
         <p:nvSpPr>
-          <p:cNvPr id="371" name="Google Shape;371;g8edad6cf0c_0_18:notes"/>
+          <p:cNvPr id="371" name="Google Shape;371;g9434fdc6fb_0_0:notes"/>
           <p:cNvSpPr txBox="1"/>
           <p:nvPr>
             <p:ph idx="1" type="body"/>
@@ -3823,7 +3823,7 @@
       </p:grpSpPr>
       <p:sp>
         <p:nvSpPr>
-          <p:cNvPr id="376" name="Google Shape;376;g9434fdc6fb_0_0:notes"/>
+          <p:cNvPr id="376" name="Google Shape;376;g9434fdc6fb_0_238:notes"/>
           <p:cNvSpPr/>
           <p:nvPr>
             <p:ph idx="2" type="sldImg"/>
@@ -3858,7 +3858,7 @@
       </p:sp>
       <p:sp>
         <p:nvSpPr>
-          <p:cNvPr id="377" name="Google Shape;377;g9434fdc6fb_0_0:notes"/>
+          <p:cNvPr id="377" name="Google Shape;377;g9434fdc6fb_0_238:notes"/>
           <p:cNvSpPr txBox="1"/>
           <p:nvPr>
             <p:ph idx="1" type="body"/>
@@ -3889,7 +3889,8 @@
               <a:buNone/>
             </a:pPr>
             <a:r>
-              <a:t/>
+              <a:rPr lang="fr"/>
+              <a:t>1.b) namenode secondaire et datanodes</a:t>
             </a:r>
             <a:endParaRPr/>
           </a:p>
@@ -3922,7 +3923,7 @@
       </p:grpSpPr>
       <p:sp>
         <p:nvSpPr>
-          <p:cNvPr id="382" name="Google Shape;382;g9434fdc6fb_0_238:notes"/>
+          <p:cNvPr id="382" name="Google Shape;382;g9434fdc6fb_0_244:notes"/>
           <p:cNvSpPr/>
           <p:nvPr>
             <p:ph idx="2" type="sldImg"/>
@@ -3957,7 +3958,7 @@
       </p:sp>
       <p:sp>
         <p:nvSpPr>
-          <p:cNvPr id="383" name="Google Shape;383;g9434fdc6fb_0_238:notes"/>
+          <p:cNvPr id="383" name="Google Shape;383;g9434fdc6fb_0_244:notes"/>
           <p:cNvSpPr txBox="1"/>
           <p:nvPr>
             <p:ph idx="1" type="body"/>
@@ -4121,7 +4122,7 @@
       </p:grpSpPr>
       <p:sp>
         <p:nvSpPr>
-          <p:cNvPr id="388" name="Google Shape;388;g9434fdc6fb_0_244:notes"/>
+          <p:cNvPr id="388" name="Google Shape;388;g8bb7f8afe3_0_283:notes"/>
           <p:cNvSpPr/>
           <p:nvPr>
             <p:ph idx="2" type="sldImg"/>
@@ -4156,7 +4157,7 @@
       </p:sp>
       <p:sp>
         <p:nvSpPr>
-          <p:cNvPr id="389" name="Google Shape;389;g9434fdc6fb_0_244:notes"/>
+          <p:cNvPr id="389" name="Google Shape;389;g8bb7f8afe3_0_283:notes"/>
           <p:cNvSpPr txBox="1"/>
           <p:nvPr>
             <p:ph idx="1" type="body"/>
@@ -4187,8 +4188,7 @@
               <a:buNone/>
             </a:pPr>
             <a:r>
-              <a:rPr lang="fr"/>
-              <a:t>1.b) namenode secondaire et datanodes</a:t>
+              <a:t/>
             </a:r>
             <a:endParaRPr/>
           </a:p>
@@ -4221,7 +4221,7 @@
       </p:grpSpPr>
       <p:sp>
         <p:nvSpPr>
-          <p:cNvPr id="107" name="Google Shape;107;g8bb7f8afe3_0_283:notes"/>
+          <p:cNvPr id="107" name="Google Shape;107;g982c54720f_0_0:notes"/>
           <p:cNvSpPr/>
           <p:nvPr>
             <p:ph idx="2" type="sldImg"/>
@@ -4256,7 +4256,7 @@
       </p:sp>
       <p:sp>
         <p:nvSpPr>
-          <p:cNvPr id="108" name="Google Shape;108;g8bb7f8afe3_0_283:notes"/>
+          <p:cNvPr id="108" name="Google Shape;108;g982c54720f_0_0:notes"/>
           <p:cNvSpPr txBox="1"/>
           <p:nvPr>
             <p:ph idx="1" type="body"/>
@@ -11375,7 +11375,7 @@
             </a:pPr>
             <a:r>
               <a:rPr b="1" lang="fr" sz="4800"/>
-              <a:t>Développement d’ une architecture Big Data complète</a:t>
+              <a:t>Développement d’une architecture Big Data complète</a:t>
             </a:r>
             <a:endParaRPr b="1" sz="4800"/>
           </a:p>
@@ -11500,8 +11500,8 @@
         </p:nvSpPr>
         <p:spPr>
           <a:xfrm>
-            <a:off x="0" y="0"/>
-            <a:ext cx="2052300" cy="976200"/>
+            <a:off x="50" y="0"/>
+            <a:ext cx="9144000" cy="413100"/>
           </a:xfrm>
           <a:prstGeom prst="rect">
             <a:avLst/>
@@ -11523,30 +11523,14 @@
               <a:buNone/>
             </a:pPr>
             <a:r>
-              <a:rPr lang="fr" sz="2200"/>
-              <a:t>b</a:t>
-            </a:r>
-            <a:r>
-              <a:rPr lang="fr" sz="2200"/>
-              <a:t>) Architecture</a:t>
-            </a:r>
-            <a:endParaRPr sz="2200"/>
-          </a:p>
-          <a:p>
-            <a:pPr indent="0" lvl="0" marL="0" rtl="0" algn="l">
-              <a:spcBef>
-                <a:spcPts val="0"/>
-              </a:spcBef>
-              <a:spcAft>
-                <a:spcPts val="0"/>
-              </a:spcAft>
-              <a:buNone/>
-            </a:pPr>
-            <a:r>
-              <a:rPr lang="fr" sz="2200"/>
-              <a:t> technique:</a:t>
-            </a:r>
-            <a:endParaRPr b="1" sz="1200"/>
+              <a:rPr lang="fr" sz="2300"/>
+              <a:t>d</a:t>
+            </a:r>
+            <a:r>
+              <a:rPr lang="fr" sz="2300"/>
+              <a:t>) Serving layer: MongoDB : </a:t>
+            </a:r>
+            <a:endParaRPr b="0" sz="1300"/>
           </a:p>
         </p:txBody>
       </p:sp>
@@ -11566,8 +11550,64 @@
         </p:blipFill>
         <p:spPr>
           <a:xfrm>
-            <a:off x="2139975" y="0"/>
-            <a:ext cx="6942200" cy="4957900"/>
+            <a:off x="6180275" y="2680475"/>
+            <a:ext cx="2963725" cy="2300350"/>
+          </a:xfrm>
+          <a:prstGeom prst="rect">
+            <a:avLst/>
+          </a:prstGeom>
+          <a:noFill/>
+          <a:ln>
+            <a:noFill/>
+          </a:ln>
+        </p:spPr>
+      </p:pic>
+      <p:pic>
+        <p:nvPicPr>
+          <p:cNvPr id="141" name="Google Shape;141;p22"/>
+          <p:cNvPicPr preferRelativeResize="0"/>
+          <p:nvPr/>
+        </p:nvPicPr>
+        <p:blipFill>
+          <a:blip r:embed="rId4">
+            <a:alphaModFix/>
+          </a:blip>
+          <a:stretch>
+            <a:fillRect/>
+          </a:stretch>
+        </p:blipFill>
+        <p:spPr>
+          <a:xfrm>
+            <a:off x="-72875" y="1426775"/>
+            <a:ext cx="5942200" cy="3787325"/>
+          </a:xfrm>
+          <a:prstGeom prst="rect">
+            <a:avLst/>
+          </a:prstGeom>
+          <a:noFill/>
+          <a:ln>
+            <a:noFill/>
+          </a:ln>
+        </p:spPr>
+      </p:pic>
+      <p:pic>
+        <p:nvPicPr>
+          <p:cNvPr id="142" name="Google Shape;142;p22"/>
+          <p:cNvPicPr preferRelativeResize="0"/>
+          <p:nvPr/>
+        </p:nvPicPr>
+        <p:blipFill>
+          <a:blip r:embed="rId5">
+            <a:alphaModFix/>
+          </a:blip>
+          <a:stretch>
+            <a:fillRect/>
+          </a:stretch>
+        </p:blipFill>
+        <p:spPr>
+          <a:xfrm>
+            <a:off x="3667113" y="93275"/>
+            <a:ext cx="5476875" cy="1333500"/>
           </a:xfrm>
           <a:prstGeom prst="rect">
             <a:avLst/>
@@ -11591,7 +11631,7 @@
   <p:cSld>
     <p:spTree>
       <p:nvGrpSpPr>
-        <p:cNvPr id="144" name="Shape 144"/>
+        <p:cNvPr id="146" name="Shape 146"/>
         <p:cNvGrpSpPr/>
         <p:nvPr/>
       </p:nvGrpSpPr>
@@ -11605,7 +11645,7 @@
       </p:grpSpPr>
       <p:sp>
         <p:nvSpPr>
-          <p:cNvPr id="145" name="Google Shape;145;p23"/>
+          <p:cNvPr id="147" name="Google Shape;147;p23"/>
           <p:cNvSpPr txBox="1"/>
           <p:nvPr>
             <p:ph type="title"/>
@@ -11613,8 +11653,8 @@
         </p:nvSpPr>
         <p:spPr>
           <a:xfrm>
-            <a:off x="311700" y="1405050"/>
-            <a:ext cx="8520600" cy="1548300"/>
+            <a:off x="0" y="0"/>
+            <a:ext cx="2052300" cy="976200"/>
           </a:xfrm>
           <a:prstGeom prst="rect">
             <a:avLst/>
@@ -11626,31 +11666,71 @@
           </a:bodyPr>
           <a:lstStyle/>
           <a:p>
-            <a:pPr indent="0" lvl="0" marL="0" rtl="0" algn="ctr">
-              <a:spcBef>
-                <a:spcPts val="0"/>
-              </a:spcBef>
-              <a:spcAft>
-                <a:spcPts val="0"/>
-              </a:spcAft>
-              <a:buNone/>
-            </a:pPr>
-            <a:r>
-              <a:rPr b="1" lang="fr" sz="4600"/>
-              <a:t>4</a:t>
-            </a:r>
-            <a:r>
-              <a:rPr b="1" lang="fr" sz="4600"/>
-              <a:t>. </a:t>
-            </a:r>
-            <a:r>
-              <a:rPr b="1" lang="fr" sz="4600"/>
-              <a:t>Mise en oeuvre de la solution proposée</a:t>
-            </a:r>
-            <a:endParaRPr b="1" sz="4600"/>
+            <a:pPr indent="0" lvl="0" marL="0" rtl="0" algn="l">
+              <a:spcBef>
+                <a:spcPts val="0"/>
+              </a:spcBef>
+              <a:spcAft>
+                <a:spcPts val="0"/>
+              </a:spcAft>
+              <a:buNone/>
+            </a:pPr>
+            <a:r>
+              <a:rPr lang="fr" sz="2200"/>
+              <a:t>b</a:t>
+            </a:r>
+            <a:r>
+              <a:rPr lang="fr" sz="2200"/>
+              <a:t>) Architecture</a:t>
+            </a:r>
+            <a:endParaRPr sz="2200"/>
+          </a:p>
+          <a:p>
+            <a:pPr indent="0" lvl="0" marL="0" rtl="0" algn="l">
+              <a:spcBef>
+                <a:spcPts val="0"/>
+              </a:spcBef>
+              <a:spcAft>
+                <a:spcPts val="0"/>
+              </a:spcAft>
+              <a:buNone/>
+            </a:pPr>
+            <a:r>
+              <a:rPr lang="fr" sz="2200"/>
+              <a:t> technique:</a:t>
+            </a:r>
+            <a:endParaRPr b="1" sz="1200"/>
           </a:p>
         </p:txBody>
       </p:sp>
+      <p:pic>
+        <p:nvPicPr>
+          <p:cNvPr id="148" name="Google Shape;148;p23"/>
+          <p:cNvPicPr preferRelativeResize="0"/>
+          <p:nvPr/>
+        </p:nvPicPr>
+        <p:blipFill>
+          <a:blip r:embed="rId3">
+            <a:alphaModFix/>
+          </a:blip>
+          <a:stretch>
+            <a:fillRect/>
+          </a:stretch>
+        </p:blipFill>
+        <p:spPr>
+          <a:xfrm>
+            <a:off x="2139975" y="0"/>
+            <a:ext cx="6942200" cy="4957900"/>
+          </a:xfrm>
+          <a:prstGeom prst="rect">
+            <a:avLst/>
+          </a:prstGeom>
+          <a:noFill/>
+          <a:ln>
+            <a:noFill/>
+          </a:ln>
+        </p:spPr>
+      </p:pic>
     </p:spTree>
   </p:cSld>
   <p:clrMapOvr>
@@ -11664,7 +11744,7 @@
   <p:cSld>
     <p:spTree>
       <p:nvGrpSpPr>
-        <p:cNvPr id="149" name="Shape 149"/>
+        <p:cNvPr id="152" name="Shape 152"/>
         <p:cNvGrpSpPr/>
         <p:nvPr/>
       </p:nvGrpSpPr>
@@ -11678,7 +11758,7 @@
       </p:grpSpPr>
       <p:sp>
         <p:nvSpPr>
-          <p:cNvPr id="150" name="Google Shape;150;p24"/>
+          <p:cNvPr id="153" name="Google Shape;153;p24"/>
           <p:cNvSpPr txBox="1"/>
           <p:nvPr>
             <p:ph type="title"/>
@@ -11686,8 +11766,8 @@
         </p:nvSpPr>
         <p:spPr>
           <a:xfrm>
-            <a:off x="50" y="0"/>
-            <a:ext cx="4929600" cy="713400"/>
+            <a:off x="311700" y="1405050"/>
+            <a:ext cx="8520600" cy="1548300"/>
           </a:xfrm>
           <a:prstGeom prst="rect">
             <a:avLst/>
@@ -11699,6 +11779,79 @@
           </a:bodyPr>
           <a:lstStyle/>
           <a:p>
+            <a:pPr indent="0" lvl="0" marL="0" rtl="0" algn="ctr">
+              <a:spcBef>
+                <a:spcPts val="0"/>
+              </a:spcBef>
+              <a:spcAft>
+                <a:spcPts val="0"/>
+              </a:spcAft>
+              <a:buNone/>
+            </a:pPr>
+            <a:r>
+              <a:rPr b="1" lang="fr" sz="4600"/>
+              <a:t>4</a:t>
+            </a:r>
+            <a:r>
+              <a:rPr b="1" lang="fr" sz="4600"/>
+              <a:t>. </a:t>
+            </a:r>
+            <a:r>
+              <a:rPr b="1" lang="fr" sz="4600"/>
+              <a:t>Mise en oeuvre de la solution proposée</a:t>
+            </a:r>
+            <a:endParaRPr b="1" sz="4600"/>
+          </a:p>
+        </p:txBody>
+      </p:sp>
+    </p:spTree>
+  </p:cSld>
+  <p:clrMapOvr>
+    <a:masterClrMapping/>
+  </p:clrMapOvr>
+</p:sld>
+</file>
+
+<file path=ppt/slides/slide13.xml><?xml version="1.0" encoding="utf-8"?>
+<p:sld xmlns:a="http://schemas.openxmlformats.org/drawingml/2006/main" xmlns:r="http://schemas.openxmlformats.org/officeDocument/2006/relationships" xmlns:mc="http://schemas.openxmlformats.org/markup-compatibility/2006" xmlns:mv="urn:schemas-microsoft-com:mac:vml" xmlns:p="http://schemas.openxmlformats.org/presentationml/2006/main" xmlns:c="http://schemas.openxmlformats.org/drawingml/2006/chart" xmlns:dgm="http://schemas.openxmlformats.org/drawingml/2006/diagram" xmlns:o="urn:schemas-microsoft-com:office:office" xmlns:v="urn:schemas-microsoft-com:vml" xmlns:pvml="urn:schemas-microsoft-com:office:powerpoint" xmlns:com="http://schemas.openxmlformats.org/drawingml/2006/compatibility" xmlns:p14="http://schemas.microsoft.com/office/powerpoint/2010/main" xmlns:p15="http://schemas.microsoft.com/office/powerpoint/2012/main" xmlns:ahyp="http://schemas.microsoft.com/office/drawing/2018/hyperlinkcolor">
+  <p:cSld>
+    <p:spTree>
+      <p:nvGrpSpPr>
+        <p:cNvPr id="157" name="Shape 157"/>
+        <p:cNvGrpSpPr/>
+        <p:nvPr/>
+      </p:nvGrpSpPr>
+      <p:grpSpPr>
+        <a:xfrm>
+          <a:off x="0" y="0"/>
+          <a:ext cx="0" cy="0"/>
+          <a:chOff x="0" y="0"/>
+          <a:chExt cx="0" cy="0"/>
+        </a:xfrm>
+      </p:grpSpPr>
+      <p:sp>
+        <p:nvSpPr>
+          <p:cNvPr id="158" name="Google Shape;158;p25"/>
+          <p:cNvSpPr txBox="1"/>
+          <p:nvPr>
+            <p:ph type="title"/>
+          </p:nvPr>
+        </p:nvSpPr>
+        <p:spPr>
+          <a:xfrm>
+            <a:off x="50" y="0"/>
+            <a:ext cx="4929600" cy="713400"/>
+          </a:xfrm>
+          <a:prstGeom prst="rect">
+            <a:avLst/>
+          </a:prstGeom>
+        </p:spPr>
+        <p:txBody>
+          <a:bodyPr anchorCtr="0" anchor="ctr" bIns="91425" lIns="91425" spcFirstLastPara="1" rIns="91425" wrap="square" tIns="91425">
+            <a:noAutofit/>
+          </a:bodyPr>
+          <a:lstStyle/>
+          <a:p>
             <a:pPr indent="0" lvl="0" marL="0" rtl="0" algn="l">
               <a:spcBef>
                 <a:spcPts val="0"/>
@@ -11722,7 +11875,7 @@
       </p:sp>
       <p:sp>
         <p:nvSpPr>
-          <p:cNvPr id="151" name="Google Shape;151;p24"/>
+          <p:cNvPr id="159" name="Google Shape;159;p25"/>
           <p:cNvSpPr/>
           <p:nvPr/>
         </p:nvSpPr>
@@ -11788,7 +11941,7 @@
       </p:sp>
       <p:sp>
         <p:nvSpPr>
-          <p:cNvPr id="152" name="Google Shape;152;p24"/>
+          <p:cNvPr id="160" name="Google Shape;160;p25"/>
           <p:cNvSpPr/>
           <p:nvPr/>
         </p:nvSpPr>
@@ -11869,7 +12022,7 @@
       </p:sp>
       <p:grpSp>
         <p:nvGrpSpPr>
-          <p:cNvPr id="153" name="Google Shape;153;p24"/>
+          <p:cNvPr id="161" name="Google Shape;161;p25"/>
           <p:cNvGrpSpPr/>
           <p:nvPr/>
         </p:nvGrpSpPr>
@@ -11883,7 +12036,7 @@
         </p:grpSpPr>
         <p:sp>
           <p:nvSpPr>
-            <p:cNvPr id="154" name="Google Shape;154;p24"/>
+            <p:cNvPr id="162" name="Google Shape;162;p25"/>
             <p:cNvSpPr/>
             <p:nvPr/>
           </p:nvSpPr>
@@ -11941,7 +12094,7 @@
         </p:sp>
         <p:sp>
           <p:nvSpPr>
-            <p:cNvPr id="155" name="Google Shape;155;p24"/>
+            <p:cNvPr id="163" name="Google Shape;163;p25"/>
             <p:cNvSpPr/>
             <p:nvPr/>
           </p:nvSpPr>
@@ -11991,7 +12144,7 @@
         </p:sp>
         <p:sp>
           <p:nvSpPr>
-            <p:cNvPr id="156" name="Google Shape;156;p24"/>
+            <p:cNvPr id="164" name="Google Shape;164;p25"/>
             <p:cNvSpPr/>
             <p:nvPr/>
           </p:nvSpPr>
@@ -12041,7 +12194,7 @@
         </p:sp>
         <p:sp>
           <p:nvSpPr>
-            <p:cNvPr id="157" name="Google Shape;157;p24"/>
+            <p:cNvPr id="165" name="Google Shape;165;p25"/>
             <p:cNvSpPr/>
             <p:nvPr/>
           </p:nvSpPr>
@@ -12092,7 +12245,7 @@
       </p:grpSp>
       <p:sp>
         <p:nvSpPr>
-          <p:cNvPr id="158" name="Google Shape;158;p24"/>
+          <p:cNvPr id="166" name="Google Shape;166;p25"/>
           <p:cNvSpPr/>
           <p:nvPr/>
         </p:nvSpPr>
@@ -12150,7 +12303,11 @@
             </a:pPr>
             <a:r>
               <a:rPr lang="fr" sz="1200"/>
-              <a:t>currencyKafkaSpout</a:t>
+              <a:t>tweets</a:t>
+            </a:r>
+            <a:r>
+              <a:rPr lang="fr" sz="1200"/>
+              <a:t>KafkaSpout</a:t>
             </a:r>
             <a:endParaRPr sz="1200"/>
           </a:p>
@@ -12158,7 +12315,7 @@
       </p:sp>
       <p:sp>
         <p:nvSpPr>
-          <p:cNvPr id="159" name="Google Shape;159;p24"/>
+          <p:cNvPr id="167" name="Google Shape;167;p25"/>
           <p:cNvSpPr/>
           <p:nvPr/>
         </p:nvSpPr>
@@ -12216,7 +12373,7 @@
             </a:pPr>
             <a:r>
               <a:rPr lang="fr" sz="1200"/>
-              <a:t>tweetsKafkaSpout</a:t>
+              <a:t>connecteurSpark</a:t>
             </a:r>
             <a:endParaRPr sz="1200"/>
           </a:p>
@@ -12224,10 +12381,10 @@
       </p:sp>
       <p:cxnSp>
         <p:nvCxnSpPr>
-          <p:cNvPr id="160" name="Google Shape;160;p24"/>
+          <p:cNvPr id="168" name="Google Shape;168;p25"/>
           <p:cNvCxnSpPr>
-            <a:stCxn id="151" idx="2"/>
-            <a:endCxn id="154" idx="0"/>
+            <a:stCxn id="159" idx="2"/>
+            <a:endCxn id="162" idx="0"/>
           </p:cNvCxnSpPr>
           <p:nvPr/>
         </p:nvCxnSpPr>
@@ -12253,10 +12410,10 @@
       </p:cxnSp>
       <p:cxnSp>
         <p:nvCxnSpPr>
-          <p:cNvPr id="161" name="Google Shape;161;p24"/>
+          <p:cNvPr id="169" name="Google Shape;169;p25"/>
           <p:cNvCxnSpPr>
-            <a:stCxn id="155" idx="2"/>
-            <a:endCxn id="158" idx="0"/>
+            <a:stCxn id="163" idx="2"/>
+            <a:endCxn id="166" idx="0"/>
           </p:cNvCxnSpPr>
           <p:nvPr/>
         </p:nvCxnSpPr>
@@ -12282,10 +12439,10 @@
       </p:cxnSp>
       <p:cxnSp>
         <p:nvCxnSpPr>
-          <p:cNvPr id="162" name="Google Shape;162;p24"/>
+          <p:cNvPr id="170" name="Google Shape;170;p25"/>
           <p:cNvCxnSpPr>
-            <a:stCxn id="155" idx="2"/>
-            <a:endCxn id="159" idx="0"/>
+            <a:stCxn id="163" idx="2"/>
+            <a:endCxn id="167" idx="0"/>
           </p:cNvCxnSpPr>
           <p:nvPr/>
         </p:nvCxnSpPr>
@@ -12311,7 +12468,7 @@
       </p:cxnSp>
       <p:pic>
         <p:nvPicPr>
-          <p:cNvPr id="163" name="Google Shape;163;p24"/>
+          <p:cNvPr id="171" name="Google Shape;171;p25"/>
           <p:cNvPicPr preferRelativeResize="0"/>
           <p:nvPr/>
         </p:nvPicPr>
@@ -12327,107 +12484,6 @@
           <a:xfrm>
             <a:off x="50" y="713400"/>
             <a:ext cx="5726000" cy="4043000"/>
-          </a:xfrm>
-          <a:prstGeom prst="rect">
-            <a:avLst/>
-          </a:prstGeom>
-          <a:noFill/>
-          <a:ln>
-            <a:noFill/>
-          </a:ln>
-        </p:spPr>
-      </p:pic>
-    </p:spTree>
-  </p:cSld>
-  <p:clrMapOvr>
-    <a:masterClrMapping/>
-  </p:clrMapOvr>
-</p:sld>
-</file>
-
-<file path=ppt/slides/slide13.xml><?xml version="1.0" encoding="utf-8"?>
-<p:sld xmlns:a="http://schemas.openxmlformats.org/drawingml/2006/main" xmlns:r="http://schemas.openxmlformats.org/officeDocument/2006/relationships" xmlns:mc="http://schemas.openxmlformats.org/markup-compatibility/2006" xmlns:mv="urn:schemas-microsoft-com:mac:vml" xmlns:p="http://schemas.openxmlformats.org/presentationml/2006/main" xmlns:c="http://schemas.openxmlformats.org/drawingml/2006/chart" xmlns:dgm="http://schemas.openxmlformats.org/drawingml/2006/diagram" xmlns:o="urn:schemas-microsoft-com:office:office" xmlns:v="urn:schemas-microsoft-com:vml" xmlns:pvml="urn:schemas-microsoft-com:office:powerpoint" xmlns:com="http://schemas.openxmlformats.org/drawingml/2006/compatibility" xmlns:p14="http://schemas.microsoft.com/office/powerpoint/2010/main" xmlns:p15="http://schemas.microsoft.com/office/powerpoint/2012/main" xmlns:ahyp="http://schemas.microsoft.com/office/drawing/2018/hyperlinkcolor">
-  <p:cSld>
-    <p:spTree>
-      <p:nvGrpSpPr>
-        <p:cNvPr id="167" name="Shape 167"/>
-        <p:cNvGrpSpPr/>
-        <p:nvPr/>
-      </p:nvGrpSpPr>
-      <p:grpSpPr>
-        <a:xfrm>
-          <a:off x="0" y="0"/>
-          <a:ext cx="0" cy="0"/>
-          <a:chOff x="0" y="0"/>
-          <a:chExt cx="0" cy="0"/>
-        </a:xfrm>
-      </p:grpSpPr>
-      <p:sp>
-        <p:nvSpPr>
-          <p:cNvPr id="168" name="Google Shape;168;p25"/>
-          <p:cNvSpPr txBox="1"/>
-          <p:nvPr>
-            <p:ph type="title"/>
-          </p:nvPr>
-        </p:nvSpPr>
-        <p:spPr>
-          <a:xfrm>
-            <a:off x="50" y="0"/>
-            <a:ext cx="6094500" cy="713400"/>
-          </a:xfrm>
-          <a:prstGeom prst="rect">
-            <a:avLst/>
-          </a:prstGeom>
-        </p:spPr>
-        <p:txBody>
-          <a:bodyPr anchorCtr="0" anchor="ctr" bIns="91425" lIns="91425" spcFirstLastPara="1" rIns="91425" wrap="square" tIns="91425">
-            <a:noAutofit/>
-          </a:bodyPr>
-          <a:lstStyle/>
-          <a:p>
-            <a:pPr indent="0" lvl="0" marL="0" rtl="0" algn="l">
-              <a:spcBef>
-                <a:spcPts val="0"/>
-              </a:spcBef>
-              <a:spcAft>
-                <a:spcPts val="0"/>
-              </a:spcAft>
-              <a:buNone/>
-            </a:pPr>
-            <a:r>
-              <a:rPr lang="fr" sz="2300"/>
-              <a:t>a) </a:t>
-            </a:r>
-            <a:r>
-              <a:rPr lang="fr" sz="2300"/>
-              <a:t>Système</a:t>
-            </a:r>
-            <a:r>
-              <a:rPr lang="fr" sz="2300"/>
-              <a:t> file de message: Kafka</a:t>
-            </a:r>
-            <a:endParaRPr b="0" sz="1300"/>
-          </a:p>
-        </p:txBody>
-      </p:sp>
-      <p:pic>
-        <p:nvPicPr>
-          <p:cNvPr id="169" name="Google Shape;169;p25"/>
-          <p:cNvPicPr preferRelativeResize="0"/>
-          <p:nvPr/>
-        </p:nvPicPr>
-        <p:blipFill>
-          <a:blip r:embed="rId3">
-            <a:alphaModFix/>
-          </a:blip>
-          <a:stretch>
-            <a:fillRect/>
-          </a:stretch>
-        </p:blipFill>
-        <p:spPr>
-          <a:xfrm>
-            <a:off x="89825" y="790725"/>
-            <a:ext cx="8839200" cy="2075816"/>
           </a:xfrm>
           <a:prstGeom prst="rect">
             <a:avLst/>
@@ -12451,7 +12507,7 @@
   <p:cSld>
     <p:spTree>
       <p:nvGrpSpPr>
-        <p:cNvPr id="173" name="Shape 173"/>
+        <p:cNvPr id="175" name="Shape 175"/>
         <p:cNvGrpSpPr/>
         <p:nvPr/>
       </p:nvGrpSpPr>
@@ -12465,7 +12521,7 @@
       </p:grpSpPr>
       <p:sp>
         <p:nvSpPr>
-          <p:cNvPr id="174" name="Google Shape;174;p26"/>
+          <p:cNvPr id="176" name="Google Shape;176;p26"/>
           <p:cNvSpPr txBox="1"/>
           <p:nvPr>
             <p:ph type="title"/>
@@ -12474,7 +12530,7 @@
         <p:spPr>
           <a:xfrm>
             <a:off x="50" y="0"/>
-            <a:ext cx="9144000" cy="428700"/>
+            <a:ext cx="6094500" cy="713400"/>
           </a:xfrm>
           <a:prstGeom prst="rect">
             <a:avLst/>
@@ -12496,6 +12552,107 @@
               <a:buNone/>
             </a:pPr>
             <a:r>
+              <a:rPr lang="fr" sz="2300"/>
+              <a:t>a) </a:t>
+            </a:r>
+            <a:r>
+              <a:rPr lang="fr" sz="2300"/>
+              <a:t>Système</a:t>
+            </a:r>
+            <a:r>
+              <a:rPr lang="fr" sz="2300"/>
+              <a:t> file de message: Kafka manager</a:t>
+            </a:r>
+            <a:endParaRPr b="0" sz="1300"/>
+          </a:p>
+        </p:txBody>
+      </p:sp>
+      <p:pic>
+        <p:nvPicPr>
+          <p:cNvPr id="177" name="Google Shape;177;p26"/>
+          <p:cNvPicPr preferRelativeResize="0"/>
+          <p:nvPr/>
+        </p:nvPicPr>
+        <p:blipFill>
+          <a:blip r:embed="rId3">
+            <a:alphaModFix/>
+          </a:blip>
+          <a:stretch>
+            <a:fillRect/>
+          </a:stretch>
+        </p:blipFill>
+        <p:spPr>
+          <a:xfrm>
+            <a:off x="89825" y="790725"/>
+            <a:ext cx="8839200" cy="2075816"/>
+          </a:xfrm>
+          <a:prstGeom prst="rect">
+            <a:avLst/>
+          </a:prstGeom>
+          <a:noFill/>
+          <a:ln>
+            <a:noFill/>
+          </a:ln>
+        </p:spPr>
+      </p:pic>
+    </p:spTree>
+  </p:cSld>
+  <p:clrMapOvr>
+    <a:masterClrMapping/>
+  </p:clrMapOvr>
+</p:sld>
+</file>
+
+<file path=ppt/slides/slide15.xml><?xml version="1.0" encoding="utf-8"?>
+<p:sld xmlns:a="http://schemas.openxmlformats.org/drawingml/2006/main" xmlns:r="http://schemas.openxmlformats.org/officeDocument/2006/relationships" xmlns:mc="http://schemas.openxmlformats.org/markup-compatibility/2006" xmlns:mv="urn:schemas-microsoft-com:mac:vml" xmlns:p="http://schemas.openxmlformats.org/presentationml/2006/main" xmlns:c="http://schemas.openxmlformats.org/drawingml/2006/chart" xmlns:dgm="http://schemas.openxmlformats.org/drawingml/2006/diagram" xmlns:o="urn:schemas-microsoft-com:office:office" xmlns:v="urn:schemas-microsoft-com:vml" xmlns:pvml="urn:schemas-microsoft-com:office:powerpoint" xmlns:com="http://schemas.openxmlformats.org/drawingml/2006/compatibility" xmlns:p14="http://schemas.microsoft.com/office/powerpoint/2010/main" xmlns:p15="http://schemas.microsoft.com/office/powerpoint/2012/main" xmlns:ahyp="http://schemas.microsoft.com/office/drawing/2018/hyperlinkcolor">
+  <p:cSld>
+    <p:spTree>
+      <p:nvGrpSpPr>
+        <p:cNvPr id="181" name="Shape 181"/>
+        <p:cNvGrpSpPr/>
+        <p:nvPr/>
+      </p:nvGrpSpPr>
+      <p:grpSpPr>
+        <a:xfrm>
+          <a:off x="0" y="0"/>
+          <a:ext cx="0" cy="0"/>
+          <a:chOff x="0" y="0"/>
+          <a:chExt cx="0" cy="0"/>
+        </a:xfrm>
+      </p:grpSpPr>
+      <p:sp>
+        <p:nvSpPr>
+          <p:cNvPr id="182" name="Google Shape;182;p27"/>
+          <p:cNvSpPr txBox="1"/>
+          <p:nvPr>
+            <p:ph type="title"/>
+          </p:nvPr>
+        </p:nvSpPr>
+        <p:spPr>
+          <a:xfrm>
+            <a:off x="50" y="0"/>
+            <a:ext cx="9144000" cy="428700"/>
+          </a:xfrm>
+          <a:prstGeom prst="rect">
+            <a:avLst/>
+          </a:prstGeom>
+        </p:spPr>
+        <p:txBody>
+          <a:bodyPr anchorCtr="0" anchor="ctr" bIns="91425" lIns="91425" spcFirstLastPara="1" rIns="91425" wrap="square" tIns="91425">
+            <a:noAutofit/>
+          </a:bodyPr>
+          <a:lstStyle/>
+          <a:p>
+            <a:pPr indent="0" lvl="0" marL="0" rtl="0" algn="l">
+              <a:spcBef>
+                <a:spcPts val="0"/>
+              </a:spcBef>
+              <a:spcAft>
+                <a:spcPts val="0"/>
+              </a:spcAft>
+              <a:buNone/>
+            </a:pPr>
+            <a:r>
               <a:rPr b="1" lang="fr" sz="2300"/>
               <a:t>b) </a:t>
             </a:r>
@@ -12513,7 +12670,7 @@
       </p:sp>
       <p:sp>
         <p:nvSpPr>
-          <p:cNvPr id="175" name="Google Shape;175;p26"/>
+          <p:cNvPr id="183" name="Google Shape;183;p27"/>
           <p:cNvSpPr/>
           <p:nvPr/>
         </p:nvSpPr>
@@ -12588,7 +12745,7 @@
       </p:sp>
       <p:sp>
         <p:nvSpPr>
-          <p:cNvPr id="176" name="Google Shape;176;p26"/>
+          <p:cNvPr id="184" name="Google Shape;184;p27"/>
           <p:cNvSpPr/>
           <p:nvPr/>
         </p:nvSpPr>
@@ -12654,10 +12811,10 @@
       </p:sp>
       <p:cxnSp>
         <p:nvCxnSpPr>
-          <p:cNvPr id="177" name="Google Shape;177;p26"/>
+          <p:cNvPr id="185" name="Google Shape;185;p27"/>
           <p:cNvCxnSpPr>
-            <a:stCxn id="176" idx="6"/>
-            <a:endCxn id="178" idx="2"/>
+            <a:stCxn id="184" idx="6"/>
+            <a:endCxn id="186" idx="2"/>
           </p:cNvCxnSpPr>
           <p:nvPr/>
         </p:nvCxnSpPr>
@@ -12683,10 +12840,10 @@
       </p:cxnSp>
       <p:cxnSp>
         <p:nvCxnSpPr>
-          <p:cNvPr id="179" name="Google Shape;179;p26"/>
+          <p:cNvPr id="187" name="Google Shape;187;p27"/>
           <p:cNvCxnSpPr>
-            <a:stCxn id="175" idx="3"/>
-            <a:endCxn id="176" idx="2"/>
+            <a:stCxn id="183" idx="3"/>
+            <a:endCxn id="184" idx="2"/>
           </p:cNvCxnSpPr>
           <p:nvPr/>
         </p:nvCxnSpPr>
@@ -12712,7 +12869,7 @@
       </p:cxnSp>
       <p:sp>
         <p:nvSpPr>
-          <p:cNvPr id="178" name="Google Shape;178;p26"/>
+          <p:cNvPr id="186" name="Google Shape;186;p27"/>
           <p:cNvSpPr/>
           <p:nvPr/>
         </p:nvSpPr>
@@ -12778,7 +12935,7 @@
       </p:sp>
       <p:sp>
         <p:nvSpPr>
-          <p:cNvPr id="180" name="Google Shape;180;p26"/>
+          <p:cNvPr id="188" name="Google Shape;188;p27"/>
           <p:cNvSpPr txBox="1"/>
           <p:nvPr/>
         </p:nvSpPr>
@@ -12820,14 +12977,14 @@
       </p:sp>
       <p:sp>
         <p:nvSpPr>
-          <p:cNvPr id="181" name="Google Shape;181;p26"/>
+          <p:cNvPr id="189" name="Google Shape;189;p27"/>
           <p:cNvSpPr txBox="1"/>
           <p:nvPr/>
         </p:nvSpPr>
         <p:spPr>
           <a:xfrm>
             <a:off x="6470050" y="95150"/>
-            <a:ext cx="2673900" cy="863100"/>
+            <a:ext cx="2673900" cy="1068600"/>
           </a:xfrm>
           <a:prstGeom prst="rect">
             <a:avLst/>
@@ -12971,7 +13128,7 @@
       </p:sp>
       <p:sp>
         <p:nvSpPr>
-          <p:cNvPr id="182" name="Google Shape;182;p26"/>
+          <p:cNvPr id="190" name="Google Shape;190;p27"/>
           <p:cNvSpPr txBox="1"/>
           <p:nvPr/>
         </p:nvSpPr>
@@ -13065,7 +13222,7 @@
       </p:sp>
       <p:grpSp>
         <p:nvGrpSpPr>
-          <p:cNvPr id="183" name="Google Shape;183;p26"/>
+          <p:cNvPr id="191" name="Google Shape;191;p27"/>
           <p:cNvGrpSpPr/>
           <p:nvPr/>
         </p:nvGrpSpPr>
@@ -13079,7 +13236,7 @@
         </p:grpSpPr>
         <p:sp>
           <p:nvSpPr>
-            <p:cNvPr id="184" name="Google Shape;184;p26"/>
+            <p:cNvPr id="192" name="Google Shape;192;p27"/>
             <p:cNvSpPr txBox="1"/>
             <p:nvPr/>
           </p:nvSpPr>
@@ -13121,7 +13278,7 @@
         </p:sp>
         <p:pic>
           <p:nvPicPr>
-            <p:cNvPr id="185" name="Google Shape;185;p26"/>
+            <p:cNvPr id="193" name="Google Shape;193;p27"/>
             <p:cNvPicPr preferRelativeResize="0"/>
             <p:nvPr/>
           </p:nvPicPr>
@@ -13150,7 +13307,7 @@
       </p:grpSp>
       <p:cxnSp>
         <p:nvCxnSpPr>
-          <p:cNvPr id="186" name="Google Shape;186;p26"/>
+          <p:cNvPr id="194" name="Google Shape;194;p27"/>
           <p:cNvCxnSpPr/>
           <p:nvPr/>
         </p:nvCxnSpPr>
@@ -13176,7 +13333,7 @@
       </p:cxnSp>
       <p:sp>
         <p:nvSpPr>
-          <p:cNvPr id="187" name="Google Shape;187;p26"/>
+          <p:cNvPr id="195" name="Google Shape;195;p27"/>
           <p:cNvSpPr txBox="1"/>
           <p:nvPr/>
         </p:nvSpPr>
@@ -13234,7 +13391,7 @@
       </p:sp>
       <p:grpSp>
         <p:nvGrpSpPr>
-          <p:cNvPr id="188" name="Google Shape;188;p26"/>
+          <p:cNvPr id="196" name="Google Shape;196;p27"/>
           <p:cNvGrpSpPr/>
           <p:nvPr/>
         </p:nvGrpSpPr>
@@ -13248,7 +13405,7 @@
         </p:grpSpPr>
         <p:pic>
           <p:nvPicPr>
-            <p:cNvPr id="189" name="Google Shape;189;p26"/>
+            <p:cNvPr id="197" name="Google Shape;197;p27"/>
             <p:cNvPicPr preferRelativeResize="0"/>
             <p:nvPr/>
           </p:nvPicPr>
@@ -13276,7 +13433,7 @@
         </p:pic>
         <p:pic>
           <p:nvPicPr>
-            <p:cNvPr id="190" name="Google Shape;190;p26"/>
+            <p:cNvPr id="198" name="Google Shape;198;p27"/>
             <p:cNvPicPr preferRelativeResize="0"/>
             <p:nvPr/>
           </p:nvPicPr>
@@ -13311,12 +13468,12 @@
 </p:sld>
 </file>
 
-<file path=ppt/slides/slide15.xml><?xml version="1.0" encoding="utf-8"?>
+<file path=ppt/slides/slide16.xml><?xml version="1.0" encoding="utf-8"?>
 <p:sld xmlns:a="http://schemas.openxmlformats.org/drawingml/2006/main" xmlns:r="http://schemas.openxmlformats.org/officeDocument/2006/relationships" xmlns:mc="http://schemas.openxmlformats.org/markup-compatibility/2006" xmlns:mv="urn:schemas-microsoft-com:mac:vml" xmlns:p="http://schemas.openxmlformats.org/presentationml/2006/main" xmlns:c="http://schemas.openxmlformats.org/drawingml/2006/chart" xmlns:dgm="http://schemas.openxmlformats.org/drawingml/2006/diagram" xmlns:o="urn:schemas-microsoft-com:office:office" xmlns:v="urn:schemas-microsoft-com:vml" xmlns:pvml="urn:schemas-microsoft-com:office:powerpoint" xmlns:com="http://schemas.openxmlformats.org/drawingml/2006/compatibility" xmlns:p14="http://schemas.microsoft.com/office/powerpoint/2010/main" xmlns:p15="http://schemas.microsoft.com/office/powerpoint/2012/main" xmlns:ahyp="http://schemas.microsoft.com/office/drawing/2018/hyperlinkcolor">
   <p:cSld>
     <p:spTree>
       <p:nvGrpSpPr>
-        <p:cNvPr id="194" name="Shape 194"/>
+        <p:cNvPr id="202" name="Shape 202"/>
         <p:cNvGrpSpPr/>
         <p:nvPr/>
       </p:nvGrpSpPr>
@@ -13330,7 +13487,7 @@
       </p:grpSpPr>
       <p:sp>
         <p:nvSpPr>
-          <p:cNvPr id="195" name="Google Shape;195;p27"/>
+          <p:cNvPr id="203" name="Google Shape;203;p28"/>
           <p:cNvSpPr txBox="1"/>
           <p:nvPr>
             <p:ph type="title"/>
@@ -13378,7 +13535,7 @@
       </p:sp>
       <p:sp>
         <p:nvSpPr>
-          <p:cNvPr id="196" name="Google Shape;196;p27"/>
+          <p:cNvPr id="204" name="Google Shape;204;p28"/>
           <p:cNvSpPr txBox="1"/>
           <p:nvPr/>
         </p:nvSpPr>
@@ -13448,7 +13605,7 @@
       </p:sp>
       <p:pic>
         <p:nvPicPr>
-          <p:cNvPr id="197" name="Google Shape;197;p27"/>
+          <p:cNvPr id="205" name="Google Shape;205;p28"/>
           <p:cNvPicPr preferRelativeResize="0"/>
           <p:nvPr/>
         </p:nvPicPr>
@@ -13482,12 +13639,12 @@
 </p:sld>
 </file>
 
-<file path=ppt/slides/slide16.xml><?xml version="1.0" encoding="utf-8"?>
+<file path=ppt/slides/slide17.xml><?xml version="1.0" encoding="utf-8"?>
 <p:sld xmlns:a="http://schemas.openxmlformats.org/drawingml/2006/main" xmlns:r="http://schemas.openxmlformats.org/officeDocument/2006/relationships" xmlns:mc="http://schemas.openxmlformats.org/markup-compatibility/2006" xmlns:mv="urn:schemas-microsoft-com:mac:vml" xmlns:p="http://schemas.openxmlformats.org/presentationml/2006/main" xmlns:c="http://schemas.openxmlformats.org/drawingml/2006/chart" xmlns:dgm="http://schemas.openxmlformats.org/drawingml/2006/diagram" xmlns:o="urn:schemas-microsoft-com:office:office" xmlns:v="urn:schemas-microsoft-com:vml" xmlns:pvml="urn:schemas-microsoft-com:office:powerpoint" xmlns:com="http://schemas.openxmlformats.org/drawingml/2006/compatibility" xmlns:p14="http://schemas.microsoft.com/office/powerpoint/2010/main" xmlns:p15="http://schemas.microsoft.com/office/powerpoint/2012/main" xmlns:ahyp="http://schemas.microsoft.com/office/drawing/2018/hyperlinkcolor">
   <p:cSld>
     <p:spTree>
       <p:nvGrpSpPr>
-        <p:cNvPr id="201" name="Shape 201"/>
+        <p:cNvPr id="209" name="Shape 209"/>
         <p:cNvGrpSpPr/>
         <p:nvPr/>
       </p:nvGrpSpPr>
@@ -13501,7 +13658,7 @@
       </p:grpSpPr>
       <p:sp>
         <p:nvSpPr>
-          <p:cNvPr id="202" name="Google Shape;202;p28"/>
+          <p:cNvPr id="210" name="Google Shape;210;p29"/>
           <p:cNvSpPr txBox="1"/>
           <p:nvPr>
             <p:ph type="title"/>
@@ -13549,7 +13706,7 @@
       </p:sp>
       <p:pic>
         <p:nvPicPr>
-          <p:cNvPr id="203" name="Google Shape;203;p28"/>
+          <p:cNvPr id="211" name="Google Shape;211;p29"/>
           <p:cNvPicPr preferRelativeResize="0"/>
           <p:nvPr/>
         </p:nvPicPr>
@@ -13577,7 +13734,7 @@
       </p:pic>
       <p:sp>
         <p:nvSpPr>
-          <p:cNvPr id="204" name="Google Shape;204;p28"/>
+          <p:cNvPr id="212" name="Google Shape;212;p29"/>
           <p:cNvSpPr/>
           <p:nvPr/>
         </p:nvSpPr>
@@ -13627,7 +13784,7 @@
       </p:sp>
       <p:sp>
         <p:nvSpPr>
-          <p:cNvPr id="205" name="Google Shape;205;p28"/>
+          <p:cNvPr id="213" name="Google Shape;213;p29"/>
           <p:cNvSpPr/>
           <p:nvPr/>
         </p:nvSpPr>
@@ -13677,7 +13834,7 @@
       </p:sp>
       <p:sp>
         <p:nvSpPr>
-          <p:cNvPr id="206" name="Google Shape;206;p28"/>
+          <p:cNvPr id="214" name="Google Shape;214;p29"/>
           <p:cNvSpPr/>
           <p:nvPr/>
         </p:nvSpPr>
@@ -13756,9 +13913,9 @@
       </p:sp>
       <p:cxnSp>
         <p:nvCxnSpPr>
-          <p:cNvPr id="207" name="Google Shape;207;p28"/>
+          <p:cNvPr id="215" name="Google Shape;215;p29"/>
           <p:cNvCxnSpPr>
-            <a:endCxn id="204" idx="0"/>
+            <a:endCxn id="212" idx="0"/>
           </p:cNvCxnSpPr>
           <p:nvPr/>
         </p:nvCxnSpPr>
@@ -13784,10 +13941,10 @@
       </p:cxnSp>
       <p:cxnSp>
         <p:nvCxnSpPr>
-          <p:cNvPr id="208" name="Google Shape;208;p28"/>
+          <p:cNvPr id="216" name="Google Shape;216;p29"/>
           <p:cNvCxnSpPr>
-            <a:stCxn id="204" idx="2"/>
-            <a:endCxn id="205" idx="0"/>
+            <a:stCxn id="212" idx="2"/>
+            <a:endCxn id="213" idx="0"/>
           </p:cNvCxnSpPr>
           <p:nvPr/>
         </p:nvCxnSpPr>
@@ -13813,7 +13970,7 @@
       </p:cxnSp>
       <p:sp>
         <p:nvSpPr>
-          <p:cNvPr id="209" name="Google Shape;209;p28"/>
+          <p:cNvPr id="217" name="Google Shape;217;p29"/>
           <p:cNvSpPr txBox="1"/>
           <p:nvPr/>
         </p:nvSpPr>
@@ -13911,7 +14068,7 @@
       </p:sp>
       <p:sp>
         <p:nvSpPr>
-          <p:cNvPr id="210" name="Google Shape;210;p28"/>
+          <p:cNvPr id="218" name="Google Shape;218;p29"/>
           <p:cNvSpPr txBox="1"/>
           <p:nvPr/>
         </p:nvSpPr>
@@ -13965,7 +14122,7 @@
       </p:sp>
       <p:sp>
         <p:nvSpPr>
-          <p:cNvPr id="211" name="Google Shape;211;p28"/>
+          <p:cNvPr id="219" name="Google Shape;219;p29"/>
           <p:cNvSpPr/>
           <p:nvPr/>
         </p:nvSpPr>
@@ -14015,10 +14172,10 @@
       </p:sp>
       <p:cxnSp>
         <p:nvCxnSpPr>
-          <p:cNvPr id="212" name="Google Shape;212;p28"/>
+          <p:cNvPr id="220" name="Google Shape;220;p29"/>
           <p:cNvCxnSpPr>
-            <a:stCxn id="205" idx="2"/>
-            <a:endCxn id="211" idx="0"/>
+            <a:stCxn id="213" idx="2"/>
+            <a:endCxn id="219" idx="0"/>
           </p:cNvCxnSpPr>
           <p:nvPr/>
         </p:nvCxnSpPr>
@@ -14044,7 +14201,7 @@
       </p:cxnSp>
       <p:sp>
         <p:nvSpPr>
-          <p:cNvPr id="213" name="Google Shape;213;p28"/>
+          <p:cNvPr id="221" name="Google Shape;221;p29"/>
           <p:cNvSpPr txBox="1"/>
           <p:nvPr/>
         </p:nvSpPr>
@@ -14118,7 +14275,7 @@
       </p:sp>
       <p:grpSp>
         <p:nvGrpSpPr>
-          <p:cNvPr id="214" name="Google Shape;214;p28"/>
+          <p:cNvPr id="222" name="Google Shape;222;p29"/>
           <p:cNvGrpSpPr/>
           <p:nvPr/>
         </p:nvGrpSpPr>
@@ -14132,7 +14289,7 @@
         </p:grpSpPr>
         <p:sp>
           <p:nvSpPr>
-            <p:cNvPr id="215" name="Google Shape;215;p28"/>
+            <p:cNvPr id="223" name="Google Shape;223;p29"/>
             <p:cNvSpPr txBox="1"/>
             <p:nvPr/>
           </p:nvSpPr>
@@ -14174,7 +14331,7 @@
         </p:sp>
         <p:pic>
           <p:nvPicPr>
-            <p:cNvPr id="216" name="Google Shape;216;p28"/>
+            <p:cNvPr id="224" name="Google Shape;224;p29"/>
             <p:cNvPicPr preferRelativeResize="0"/>
             <p:nvPr/>
           </p:nvPicPr>
@@ -14203,7 +14360,7 @@
       </p:grpSp>
       <p:sp>
         <p:nvSpPr>
-          <p:cNvPr id="217" name="Google Shape;217;p28"/>
+          <p:cNvPr id="225" name="Google Shape;225;p29"/>
           <p:cNvSpPr/>
           <p:nvPr/>
         </p:nvSpPr>
@@ -14269,10 +14426,10 @@
       </p:sp>
       <p:cxnSp>
         <p:nvCxnSpPr>
-          <p:cNvPr id="218" name="Google Shape;218;p28"/>
+          <p:cNvPr id="226" name="Google Shape;226;p29"/>
           <p:cNvCxnSpPr>
-            <a:stCxn id="211" idx="2"/>
-            <a:endCxn id="217" idx="0"/>
+            <a:stCxn id="219" idx="2"/>
+            <a:endCxn id="225" idx="0"/>
           </p:cNvCxnSpPr>
           <p:nvPr/>
         </p:nvCxnSpPr>
@@ -14298,7 +14455,7 @@
       </p:cxnSp>
       <p:sp>
         <p:nvSpPr>
-          <p:cNvPr id="219" name="Google Shape;219;p28"/>
+          <p:cNvPr id="227" name="Google Shape;227;p29"/>
           <p:cNvSpPr txBox="1"/>
           <p:nvPr/>
         </p:nvSpPr>
@@ -14374,274 +14531,6 @@
               <a:solidFill>
                 <a:srgbClr val="FF00FF"/>
               </a:solidFill>
-            </a:endParaRPr>
-          </a:p>
-        </p:txBody>
-      </p:sp>
-    </p:spTree>
-  </p:cSld>
-  <p:clrMapOvr>
-    <a:masterClrMapping/>
-  </p:clrMapOvr>
-</p:sld>
-</file>
-
-<file path=ppt/slides/slide17.xml><?xml version="1.0" encoding="utf-8"?>
-<p:sld xmlns:a="http://schemas.openxmlformats.org/drawingml/2006/main" xmlns:r="http://schemas.openxmlformats.org/officeDocument/2006/relationships" xmlns:mc="http://schemas.openxmlformats.org/markup-compatibility/2006" xmlns:mv="urn:schemas-microsoft-com:mac:vml" xmlns:p="http://schemas.openxmlformats.org/presentationml/2006/main" xmlns:c="http://schemas.openxmlformats.org/drawingml/2006/chart" xmlns:dgm="http://schemas.openxmlformats.org/drawingml/2006/diagram" xmlns:o="urn:schemas-microsoft-com:office:office" xmlns:v="urn:schemas-microsoft-com:vml" xmlns:pvml="urn:schemas-microsoft-com:office:powerpoint" xmlns:com="http://schemas.openxmlformats.org/drawingml/2006/compatibility" xmlns:p14="http://schemas.microsoft.com/office/powerpoint/2010/main" xmlns:p15="http://schemas.microsoft.com/office/powerpoint/2012/main" xmlns:ahyp="http://schemas.microsoft.com/office/drawing/2018/hyperlinkcolor">
-  <p:cSld>
-    <p:spTree>
-      <p:nvGrpSpPr>
-        <p:cNvPr id="223" name="Shape 223"/>
-        <p:cNvGrpSpPr/>
-        <p:nvPr/>
-      </p:nvGrpSpPr>
-      <p:grpSpPr>
-        <a:xfrm>
-          <a:off x="0" y="0"/>
-          <a:ext cx="0" cy="0"/>
-          <a:chOff x="0" y="0"/>
-          <a:chExt cx="0" cy="0"/>
-        </a:xfrm>
-      </p:grpSpPr>
-      <p:sp>
-        <p:nvSpPr>
-          <p:cNvPr id="224" name="Google Shape;224;p29"/>
-          <p:cNvSpPr txBox="1"/>
-          <p:nvPr>
-            <p:ph type="title"/>
-          </p:nvPr>
-        </p:nvSpPr>
-        <p:spPr>
-          <a:xfrm>
-            <a:off x="50" y="0"/>
-            <a:ext cx="9144000" cy="413100"/>
-          </a:xfrm>
-          <a:prstGeom prst="rect">
-            <a:avLst/>
-          </a:prstGeom>
-        </p:spPr>
-        <p:txBody>
-          <a:bodyPr anchorCtr="0" anchor="ctr" bIns="91425" lIns="91425" spcFirstLastPara="1" rIns="91425" wrap="square" tIns="91425">
-            <a:noAutofit/>
-          </a:bodyPr>
-          <a:lstStyle/>
-          <a:p>
-            <a:pPr indent="0" lvl="0" marL="0" rtl="0" algn="l">
-              <a:spcBef>
-                <a:spcPts val="0"/>
-              </a:spcBef>
-              <a:spcAft>
-                <a:spcPts val="0"/>
-              </a:spcAft>
-              <a:buNone/>
-            </a:pPr>
-            <a:r>
-              <a:rPr lang="fr" sz="2500"/>
-              <a:t>c</a:t>
-            </a:r>
-            <a:r>
-              <a:rPr lang="fr" sz="2500"/>
-              <a:t>) Batch layer: Description du stockage et sérialisation: </a:t>
-            </a:r>
-            <a:endParaRPr b="0" sz="1500"/>
-          </a:p>
-        </p:txBody>
-      </p:sp>
-      <p:pic>
-        <p:nvPicPr>
-          <p:cNvPr id="225" name="Google Shape;225;p29"/>
-          <p:cNvPicPr preferRelativeResize="0"/>
-          <p:nvPr/>
-        </p:nvPicPr>
-        <p:blipFill>
-          <a:blip r:embed="rId3">
-            <a:alphaModFix/>
-          </a:blip>
-          <a:stretch>
-            <a:fillRect/>
-          </a:stretch>
-        </p:blipFill>
-        <p:spPr>
-          <a:xfrm>
-            <a:off x="114900" y="916775"/>
-            <a:ext cx="6157125" cy="4149375"/>
-          </a:xfrm>
-          <a:prstGeom prst="rect">
-            <a:avLst/>
-          </a:prstGeom>
-          <a:noFill/>
-          <a:ln>
-            <a:noFill/>
-          </a:ln>
-        </p:spPr>
-      </p:pic>
-      <p:pic>
-        <p:nvPicPr>
-          <p:cNvPr id="226" name="Google Shape;226;p29"/>
-          <p:cNvPicPr preferRelativeResize="0"/>
-          <p:nvPr/>
-        </p:nvPicPr>
-        <p:blipFill>
-          <a:blip r:embed="rId4">
-            <a:alphaModFix/>
-          </a:blip>
-          <a:stretch>
-            <a:fillRect/>
-          </a:stretch>
-        </p:blipFill>
-        <p:spPr>
-          <a:xfrm>
-            <a:off x="4356500" y="413100"/>
-            <a:ext cx="4729675" cy="2502800"/>
-          </a:xfrm>
-          <a:prstGeom prst="rect">
-            <a:avLst/>
-          </a:prstGeom>
-          <a:noFill/>
-          <a:ln cap="flat" cmpd="sng" w="19050">
-            <a:solidFill>
-              <a:srgbClr val="FF9900"/>
-            </a:solidFill>
-            <a:prstDash val="solid"/>
-            <a:round/>
-            <a:headEnd len="sm" w="sm" type="none"/>
-            <a:tailEnd len="sm" w="sm" type="none"/>
-          </a:ln>
-        </p:spPr>
-      </p:pic>
-      <p:sp>
-        <p:nvSpPr>
-          <p:cNvPr id="227" name="Google Shape;227;p29"/>
-          <p:cNvSpPr txBox="1"/>
-          <p:nvPr/>
-        </p:nvSpPr>
-        <p:spPr>
-          <a:xfrm>
-            <a:off x="7567200" y="2915900"/>
-            <a:ext cx="1576800" cy="413100"/>
-          </a:xfrm>
-          <a:prstGeom prst="rect">
-            <a:avLst/>
-          </a:prstGeom>
-          <a:noFill/>
-          <a:ln>
-            <a:noFill/>
-          </a:ln>
-        </p:spPr>
-        <p:txBody>
-          <a:bodyPr anchorCtr="0" anchor="t" bIns="91425" lIns="91425" spcFirstLastPara="1" rIns="91425" wrap="square" tIns="91425">
-            <a:noAutofit/>
-          </a:bodyPr>
-          <a:lstStyle/>
-          <a:p>
-            <a:pPr indent="0" lvl="0" marL="0" rtl="0" algn="l">
-              <a:spcBef>
-                <a:spcPts val="0"/>
-              </a:spcBef>
-              <a:spcAft>
-                <a:spcPts val="0"/>
-              </a:spcAft>
-              <a:buNone/>
-            </a:pPr>
-            <a:r>
-              <a:rPr b="1" lang="fr">
-                <a:solidFill>
-                  <a:srgbClr val="FF9900"/>
-                </a:solidFill>
-                <a:latin typeface="Roboto"/>
-                <a:ea typeface="Roboto"/>
-                <a:cs typeface="Roboto"/>
-                <a:sym typeface="Roboto"/>
-              </a:rPr>
-              <a:t>Structure HDFS</a:t>
-            </a:r>
-            <a:endParaRPr b="1">
-              <a:solidFill>
-                <a:srgbClr val="FF9900"/>
-              </a:solidFill>
-              <a:latin typeface="Roboto"/>
-              <a:ea typeface="Roboto"/>
-              <a:cs typeface="Roboto"/>
-              <a:sym typeface="Roboto"/>
-            </a:endParaRPr>
-          </a:p>
-        </p:txBody>
-      </p:sp>
-      <p:sp>
-        <p:nvSpPr>
-          <p:cNvPr id="228" name="Google Shape;228;p29"/>
-          <p:cNvSpPr txBox="1"/>
-          <p:nvPr/>
-        </p:nvSpPr>
-        <p:spPr>
-          <a:xfrm>
-            <a:off x="114900" y="578800"/>
-            <a:ext cx="3176400" cy="413100"/>
-          </a:xfrm>
-          <a:prstGeom prst="rect">
-            <a:avLst/>
-          </a:prstGeom>
-          <a:noFill/>
-          <a:ln>
-            <a:noFill/>
-          </a:ln>
-        </p:spPr>
-        <p:txBody>
-          <a:bodyPr anchorCtr="0" anchor="t" bIns="91425" lIns="91425" spcFirstLastPara="1" rIns="91425" wrap="square" tIns="91425">
-            <a:noAutofit/>
-          </a:bodyPr>
-          <a:lstStyle/>
-          <a:p>
-            <a:pPr indent="0" lvl="0" marL="0" rtl="0" algn="l">
-              <a:spcBef>
-                <a:spcPts val="0"/>
-              </a:spcBef>
-              <a:spcAft>
-                <a:spcPts val="0"/>
-              </a:spcAft>
-              <a:buNone/>
-            </a:pPr>
-            <a:r>
-              <a:rPr b="1" lang="fr" u="sng">
-                <a:latin typeface="Roboto"/>
-                <a:ea typeface="Roboto"/>
-                <a:cs typeface="Roboto"/>
-                <a:sym typeface="Roboto"/>
-              </a:rPr>
-              <a:t>Schéma avro:</a:t>
-            </a:r>
-            <a:r>
-              <a:rPr lang="fr">
-                <a:latin typeface="Roboto"/>
-                <a:ea typeface="Roboto"/>
-                <a:cs typeface="Roboto"/>
-                <a:sym typeface="Roboto"/>
-              </a:rPr>
-              <a:t> “</a:t>
-            </a:r>
-            <a:r>
-              <a:rPr i="1" lang="fr" sz="1200">
-                <a:latin typeface="Roboto"/>
-                <a:ea typeface="Roboto"/>
-                <a:cs typeface="Roboto"/>
-                <a:sym typeface="Roboto"/>
-              </a:rPr>
-              <a:t>schemaTweets.avsc</a:t>
-            </a:r>
-            <a:r>
-              <a:rPr lang="fr">
-                <a:latin typeface="Roboto"/>
-                <a:ea typeface="Roboto"/>
-                <a:cs typeface="Roboto"/>
-                <a:sym typeface="Roboto"/>
-              </a:rPr>
-              <a:t>”</a:t>
-            </a:r>
-            <a:endParaRPr>
-              <a:latin typeface="Roboto"/>
-              <a:ea typeface="Roboto"/>
-              <a:cs typeface="Roboto"/>
-              <a:sym typeface="Roboto"/>
             </a:endParaRPr>
           </a:p>
         </p:txBody>
@@ -14659,7 +14548,7 @@
   <p:cSld>
     <p:spTree>
       <p:nvGrpSpPr>
-        <p:cNvPr id="232" name="Shape 232"/>
+        <p:cNvPr id="231" name="Shape 231"/>
         <p:cNvGrpSpPr/>
         <p:nvPr/>
       </p:nvGrpSpPr>
@@ -14673,7 +14562,7 @@
       </p:grpSpPr>
       <p:sp>
         <p:nvSpPr>
-          <p:cNvPr id="233" name="Google Shape;233;p30"/>
+          <p:cNvPr id="232" name="Google Shape;232;p30"/>
           <p:cNvSpPr txBox="1"/>
           <p:nvPr>
             <p:ph type="title"/>
@@ -14681,7 +14570,7 @@
         </p:nvSpPr>
         <p:spPr>
           <a:xfrm>
-            <a:off x="0" y="75075"/>
+            <a:off x="50" y="0"/>
             <a:ext cx="9144000" cy="413100"/>
           </a:xfrm>
           <a:prstGeom prst="rect">
@@ -14709,15 +14598,15 @@
             </a:r>
             <a:r>
               <a:rPr lang="fr" sz="2500"/>
-              <a:t>) Batch layer: Description du stockage et sérialisation:</a:t>
-            </a:r>
-            <a:endParaRPr sz="2500"/>
+              <a:t>) Batch layer: Description du stockage et sérialisation: </a:t>
+            </a:r>
+            <a:endParaRPr b="0" sz="1500"/>
           </a:p>
         </p:txBody>
       </p:sp>
       <p:pic>
         <p:nvPicPr>
-          <p:cNvPr id="234" name="Google Shape;234;p30"/>
+          <p:cNvPr id="233" name="Google Shape;233;p30"/>
           <p:cNvPicPr preferRelativeResize="0"/>
           <p:nvPr/>
         </p:nvPicPr>
@@ -14731,8 +14620,8 @@
         </p:blipFill>
         <p:spPr>
           <a:xfrm>
-            <a:off x="152400" y="820663"/>
-            <a:ext cx="8839202" cy="3927680"/>
+            <a:off x="114900" y="916775"/>
+            <a:ext cx="6157125" cy="4149375"/>
           </a:xfrm>
           <a:prstGeom prst="rect">
             <a:avLst/>
@@ -14743,6 +14632,177 @@
           </a:ln>
         </p:spPr>
       </p:pic>
+      <p:pic>
+        <p:nvPicPr>
+          <p:cNvPr id="234" name="Google Shape;234;p30"/>
+          <p:cNvPicPr preferRelativeResize="0"/>
+          <p:nvPr/>
+        </p:nvPicPr>
+        <p:blipFill>
+          <a:blip r:embed="rId4">
+            <a:alphaModFix/>
+          </a:blip>
+          <a:stretch>
+            <a:fillRect/>
+          </a:stretch>
+        </p:blipFill>
+        <p:spPr>
+          <a:xfrm>
+            <a:off x="4356500" y="413100"/>
+            <a:ext cx="4729675" cy="2502800"/>
+          </a:xfrm>
+          <a:prstGeom prst="rect">
+            <a:avLst/>
+          </a:prstGeom>
+          <a:noFill/>
+          <a:ln cap="flat" cmpd="sng" w="19050">
+            <a:solidFill>
+              <a:srgbClr val="FF9900"/>
+            </a:solidFill>
+            <a:prstDash val="solid"/>
+            <a:round/>
+            <a:headEnd len="sm" w="sm" type="none"/>
+            <a:tailEnd len="sm" w="sm" type="none"/>
+          </a:ln>
+        </p:spPr>
+      </p:pic>
+      <p:sp>
+        <p:nvSpPr>
+          <p:cNvPr id="235" name="Google Shape;235;p30"/>
+          <p:cNvSpPr txBox="1"/>
+          <p:nvPr/>
+        </p:nvSpPr>
+        <p:spPr>
+          <a:xfrm>
+            <a:off x="6732850" y="2915900"/>
+            <a:ext cx="2411400" cy="413100"/>
+          </a:xfrm>
+          <a:prstGeom prst="rect">
+            <a:avLst/>
+          </a:prstGeom>
+          <a:noFill/>
+          <a:ln>
+            <a:noFill/>
+          </a:ln>
+        </p:spPr>
+        <p:txBody>
+          <a:bodyPr anchorCtr="0" anchor="t" bIns="91425" lIns="91425" spcFirstLastPara="1" rIns="91425" wrap="square" tIns="91425">
+            <a:noAutofit/>
+          </a:bodyPr>
+          <a:lstStyle/>
+          <a:p>
+            <a:pPr indent="0" lvl="0" marL="0" rtl="0" algn="l">
+              <a:spcBef>
+                <a:spcPts val="0"/>
+              </a:spcBef>
+              <a:spcAft>
+                <a:spcPts val="0"/>
+              </a:spcAft>
+              <a:buNone/>
+            </a:pPr>
+            <a:r>
+              <a:rPr b="1" lang="fr">
+                <a:solidFill>
+                  <a:srgbClr val="FF9900"/>
+                </a:solidFill>
+                <a:latin typeface="Roboto"/>
+                <a:ea typeface="Roboto"/>
+                <a:cs typeface="Roboto"/>
+                <a:sym typeface="Roboto"/>
+              </a:rPr>
+              <a:t>Structure data lake: HDFS</a:t>
+            </a:r>
+            <a:endParaRPr b="1">
+              <a:solidFill>
+                <a:srgbClr val="FF9900"/>
+              </a:solidFill>
+              <a:latin typeface="Roboto"/>
+              <a:ea typeface="Roboto"/>
+              <a:cs typeface="Roboto"/>
+              <a:sym typeface="Roboto"/>
+            </a:endParaRPr>
+          </a:p>
+        </p:txBody>
+      </p:sp>
+      <p:sp>
+        <p:nvSpPr>
+          <p:cNvPr id="236" name="Google Shape;236;p30"/>
+          <p:cNvSpPr txBox="1"/>
+          <p:nvPr/>
+        </p:nvSpPr>
+        <p:spPr>
+          <a:xfrm>
+            <a:off x="114900" y="578800"/>
+            <a:ext cx="3176400" cy="413100"/>
+          </a:xfrm>
+          <a:prstGeom prst="rect">
+            <a:avLst/>
+          </a:prstGeom>
+          <a:noFill/>
+          <a:ln>
+            <a:noFill/>
+          </a:ln>
+        </p:spPr>
+        <p:txBody>
+          <a:bodyPr anchorCtr="0" anchor="t" bIns="91425" lIns="91425" spcFirstLastPara="1" rIns="91425" wrap="square" tIns="91425">
+            <a:noAutofit/>
+          </a:bodyPr>
+          <a:lstStyle/>
+          <a:p>
+            <a:pPr indent="0" lvl="0" marL="0" rtl="0" algn="l">
+              <a:spcBef>
+                <a:spcPts val="0"/>
+              </a:spcBef>
+              <a:spcAft>
+                <a:spcPts val="0"/>
+              </a:spcAft>
+              <a:buNone/>
+            </a:pPr>
+            <a:r>
+              <a:rPr b="1" lang="fr" u="sng">
+                <a:latin typeface="Roboto"/>
+                <a:ea typeface="Roboto"/>
+                <a:cs typeface="Roboto"/>
+                <a:sym typeface="Roboto"/>
+              </a:rPr>
+              <a:t>Schéma avro:</a:t>
+            </a:r>
+            <a:r>
+              <a:rPr lang="fr">
+                <a:latin typeface="Roboto"/>
+                <a:ea typeface="Roboto"/>
+                <a:cs typeface="Roboto"/>
+                <a:sym typeface="Roboto"/>
+              </a:rPr>
+              <a:t> “</a:t>
+            </a:r>
+            <a:r>
+              <a:rPr i="1" lang="fr" sz="1200">
+                <a:latin typeface="Roboto"/>
+                <a:ea typeface="Roboto"/>
+                <a:cs typeface="Roboto"/>
+                <a:sym typeface="Roboto"/>
+              </a:rPr>
+              <a:t>schemaTweets.avsc</a:t>
+            </a:r>
+            <a:r>
+              <a:rPr lang="fr">
+                <a:latin typeface="Roboto"/>
+                <a:ea typeface="Roboto"/>
+                <a:cs typeface="Roboto"/>
+                <a:sym typeface="Roboto"/>
+              </a:rPr>
+              <a:t>”</a:t>
+            </a:r>
+            <a:endParaRPr>
+              <a:latin typeface="Roboto"/>
+              <a:ea typeface="Roboto"/>
+              <a:cs typeface="Roboto"/>
+              <a:sym typeface="Roboto"/>
+            </a:endParaRPr>
+          </a:p>
+        </p:txBody>
+      </p:sp>
     </p:spTree>
   </p:cSld>
   <p:clrMapOvr>
@@ -14756,7 +14816,7 @@
   <p:cSld>
     <p:spTree>
       <p:nvGrpSpPr>
-        <p:cNvPr id="238" name="Shape 238"/>
+        <p:cNvPr id="240" name="Shape 240"/>
         <p:cNvGrpSpPr/>
         <p:nvPr/>
       </p:nvGrpSpPr>
@@ -14770,7 +14830,7 @@
       </p:grpSpPr>
       <p:sp>
         <p:nvSpPr>
-          <p:cNvPr id="239" name="Google Shape;239;p31"/>
+          <p:cNvPr id="241" name="Google Shape;241;p31"/>
           <p:cNvSpPr txBox="1"/>
           <p:nvPr>
             <p:ph type="title"/>
@@ -14778,7 +14838,7 @@
         </p:nvSpPr>
         <p:spPr>
           <a:xfrm>
-            <a:off x="50" y="0"/>
+            <a:off x="0" y="75075"/>
             <a:ext cx="9144000" cy="413100"/>
           </a:xfrm>
           <a:prstGeom prst="rect">
@@ -14801,20 +14861,20 @@
               <a:buNone/>
             </a:pPr>
             <a:r>
-              <a:rPr lang="fr" sz="2200"/>
+              <a:rPr lang="fr" sz="2500"/>
               <a:t>c</a:t>
             </a:r>
             <a:r>
-              <a:rPr lang="fr" sz="2200"/>
-              <a:t>) Batch layer: Description du stockage et sérialisation: </a:t>
-            </a:r>
-            <a:endParaRPr sz="2200"/>
+              <a:rPr lang="fr" sz="2500"/>
+              <a:t>) Batch layer: Description du stockage et sérialisation:</a:t>
+            </a:r>
+            <a:endParaRPr sz="2500"/>
           </a:p>
         </p:txBody>
       </p:sp>
       <p:pic>
         <p:nvPicPr>
-          <p:cNvPr id="240" name="Google Shape;240;p31"/>
+          <p:cNvPr id="242" name="Google Shape;242;p31"/>
           <p:cNvPicPr preferRelativeResize="0"/>
           <p:nvPr/>
         </p:nvPicPr>
@@ -14828,36 +14888,8 @@
         </p:blipFill>
         <p:spPr>
           <a:xfrm>
-            <a:off x="0" y="419350"/>
-            <a:ext cx="7233400" cy="2657150"/>
-          </a:xfrm>
-          <a:prstGeom prst="rect">
-            <a:avLst/>
-          </a:prstGeom>
-          <a:noFill/>
-          <a:ln>
-            <a:noFill/>
-          </a:ln>
-        </p:spPr>
-      </p:pic>
-      <p:pic>
-        <p:nvPicPr>
-          <p:cNvPr id="241" name="Google Shape;241;p31"/>
-          <p:cNvPicPr preferRelativeResize="0"/>
-          <p:nvPr/>
-        </p:nvPicPr>
-        <p:blipFill>
-          <a:blip r:embed="rId4">
-            <a:alphaModFix/>
-          </a:blip>
-          <a:stretch>
-            <a:fillRect/>
-          </a:stretch>
-        </p:blipFill>
-        <p:spPr>
-          <a:xfrm>
-            <a:off x="623200" y="3082750"/>
-            <a:ext cx="8520861" cy="2060750"/>
+            <a:off x="152400" y="820663"/>
+            <a:ext cx="8839202" cy="3927680"/>
           </a:xfrm>
           <a:prstGeom prst="rect">
             <a:avLst/>
@@ -15278,7 +15310,7 @@
   <p:cSld>
     <p:spTree>
       <p:nvGrpSpPr>
-        <p:cNvPr id="245" name="Shape 245"/>
+        <p:cNvPr id="246" name="Shape 246"/>
         <p:cNvGrpSpPr/>
         <p:nvPr/>
       </p:nvGrpSpPr>
@@ -15292,7 +15324,7 @@
       </p:grpSpPr>
       <p:sp>
         <p:nvSpPr>
-          <p:cNvPr id="246" name="Google Shape;246;p32"/>
+          <p:cNvPr id="247" name="Google Shape;247;p32"/>
           <p:cNvSpPr txBox="1"/>
           <p:nvPr>
             <p:ph type="title"/>
@@ -15323,6 +15355,131 @@
               <a:buNone/>
             </a:pPr>
             <a:r>
+              <a:rPr lang="fr" sz="2200"/>
+              <a:t>c</a:t>
+            </a:r>
+            <a:r>
+              <a:rPr lang="fr" sz="2200"/>
+              <a:t>) Batch layer: Description du stockage et sérialisation: </a:t>
+            </a:r>
+            <a:endParaRPr sz="2200"/>
+          </a:p>
+        </p:txBody>
+      </p:sp>
+      <p:pic>
+        <p:nvPicPr>
+          <p:cNvPr id="248" name="Google Shape;248;p32"/>
+          <p:cNvPicPr preferRelativeResize="0"/>
+          <p:nvPr/>
+        </p:nvPicPr>
+        <p:blipFill>
+          <a:blip r:embed="rId3">
+            <a:alphaModFix/>
+          </a:blip>
+          <a:stretch>
+            <a:fillRect/>
+          </a:stretch>
+        </p:blipFill>
+        <p:spPr>
+          <a:xfrm>
+            <a:off x="0" y="419350"/>
+            <a:ext cx="7233400" cy="2657150"/>
+          </a:xfrm>
+          <a:prstGeom prst="rect">
+            <a:avLst/>
+          </a:prstGeom>
+          <a:noFill/>
+          <a:ln>
+            <a:noFill/>
+          </a:ln>
+        </p:spPr>
+      </p:pic>
+      <p:pic>
+        <p:nvPicPr>
+          <p:cNvPr id="249" name="Google Shape;249;p32"/>
+          <p:cNvPicPr preferRelativeResize="0"/>
+          <p:nvPr/>
+        </p:nvPicPr>
+        <p:blipFill>
+          <a:blip r:embed="rId4">
+            <a:alphaModFix/>
+          </a:blip>
+          <a:stretch>
+            <a:fillRect/>
+          </a:stretch>
+        </p:blipFill>
+        <p:spPr>
+          <a:xfrm>
+            <a:off x="623200" y="3082750"/>
+            <a:ext cx="8520861" cy="2060750"/>
+          </a:xfrm>
+          <a:prstGeom prst="rect">
+            <a:avLst/>
+          </a:prstGeom>
+          <a:noFill/>
+          <a:ln>
+            <a:noFill/>
+          </a:ln>
+        </p:spPr>
+      </p:pic>
+    </p:spTree>
+  </p:cSld>
+  <p:clrMapOvr>
+    <a:masterClrMapping/>
+  </p:clrMapOvr>
+</p:sld>
+</file>
+
+<file path=ppt/slides/slide21.xml><?xml version="1.0" encoding="utf-8"?>
+<p:sld xmlns:a="http://schemas.openxmlformats.org/drawingml/2006/main" xmlns:r="http://schemas.openxmlformats.org/officeDocument/2006/relationships" xmlns:mc="http://schemas.openxmlformats.org/markup-compatibility/2006" xmlns:mv="urn:schemas-microsoft-com:mac:vml" xmlns:p="http://schemas.openxmlformats.org/presentationml/2006/main" xmlns:c="http://schemas.openxmlformats.org/drawingml/2006/chart" xmlns:dgm="http://schemas.openxmlformats.org/drawingml/2006/diagram" xmlns:o="urn:schemas-microsoft-com:office:office" xmlns:v="urn:schemas-microsoft-com:vml" xmlns:pvml="urn:schemas-microsoft-com:office:powerpoint" xmlns:com="http://schemas.openxmlformats.org/drawingml/2006/compatibility" xmlns:p14="http://schemas.microsoft.com/office/powerpoint/2010/main" xmlns:p15="http://schemas.microsoft.com/office/powerpoint/2012/main" xmlns:ahyp="http://schemas.microsoft.com/office/drawing/2018/hyperlinkcolor">
+  <p:cSld>
+    <p:spTree>
+      <p:nvGrpSpPr>
+        <p:cNvPr id="253" name="Shape 253"/>
+        <p:cNvGrpSpPr/>
+        <p:nvPr/>
+      </p:nvGrpSpPr>
+      <p:grpSpPr>
+        <a:xfrm>
+          <a:off x="0" y="0"/>
+          <a:ext cx="0" cy="0"/>
+          <a:chOff x="0" y="0"/>
+          <a:chExt cx="0" cy="0"/>
+        </a:xfrm>
+      </p:grpSpPr>
+      <p:sp>
+        <p:nvSpPr>
+          <p:cNvPr id="254" name="Google Shape;254;p33"/>
+          <p:cNvSpPr txBox="1"/>
+          <p:nvPr>
+            <p:ph type="title"/>
+          </p:nvPr>
+        </p:nvSpPr>
+        <p:spPr>
+          <a:xfrm>
+            <a:off x="50" y="0"/>
+            <a:ext cx="9144000" cy="413100"/>
+          </a:xfrm>
+          <a:prstGeom prst="rect">
+            <a:avLst/>
+          </a:prstGeom>
+        </p:spPr>
+        <p:txBody>
+          <a:bodyPr anchorCtr="0" anchor="ctr" bIns="91425" lIns="91425" spcFirstLastPara="1" rIns="91425" wrap="square" tIns="91425">
+            <a:noAutofit/>
+          </a:bodyPr>
+          <a:lstStyle/>
+          <a:p>
+            <a:pPr indent="0" lvl="0" marL="0" rtl="0" algn="l">
+              <a:spcBef>
+                <a:spcPts val="0"/>
+              </a:spcBef>
+              <a:spcAft>
+                <a:spcPts val="0"/>
+              </a:spcAft>
+              <a:buNone/>
+            </a:pPr>
+            <a:r>
               <a:rPr lang="fr" sz="2400"/>
               <a:t>c</a:t>
             </a:r>
@@ -15336,7 +15493,7 @@
       </p:sp>
       <p:sp>
         <p:nvSpPr>
-          <p:cNvPr id="247" name="Google Shape;247;p32"/>
+          <p:cNvPr id="255" name="Google Shape;255;p33"/>
           <p:cNvSpPr/>
           <p:nvPr/>
         </p:nvSpPr>
@@ -15390,7 +15547,7 @@
       </p:sp>
       <p:sp>
         <p:nvSpPr>
-          <p:cNvPr id="248" name="Google Shape;248;p32"/>
+          <p:cNvPr id="256" name="Google Shape;256;p33"/>
           <p:cNvSpPr/>
           <p:nvPr/>
         </p:nvSpPr>
@@ -15444,10 +15601,10 @@
       </p:sp>
       <p:cxnSp>
         <p:nvCxnSpPr>
-          <p:cNvPr id="249" name="Google Shape;249;p32"/>
+          <p:cNvPr id="257" name="Google Shape;257;p33"/>
           <p:cNvCxnSpPr>
-            <a:stCxn id="250" idx="2"/>
-            <a:endCxn id="247" idx="0"/>
+            <a:stCxn id="258" idx="2"/>
+            <a:endCxn id="255" idx="0"/>
           </p:cNvCxnSpPr>
           <p:nvPr/>
         </p:nvCxnSpPr>
@@ -15473,10 +15630,10 @@
       </p:cxnSp>
       <p:cxnSp>
         <p:nvCxnSpPr>
-          <p:cNvPr id="251" name="Google Shape;251;p32"/>
+          <p:cNvPr id="259" name="Google Shape;259;p33"/>
           <p:cNvCxnSpPr>
-            <a:stCxn id="247" idx="2"/>
-            <a:endCxn id="248" idx="0"/>
+            <a:stCxn id="255" idx="2"/>
+            <a:endCxn id="256" idx="0"/>
           </p:cNvCxnSpPr>
           <p:nvPr/>
         </p:nvCxnSpPr>
@@ -15502,7 +15659,7 @@
       </p:cxnSp>
       <p:sp>
         <p:nvSpPr>
-          <p:cNvPr id="252" name="Google Shape;252;p32"/>
+          <p:cNvPr id="260" name="Google Shape;260;p33"/>
           <p:cNvSpPr txBox="1"/>
           <p:nvPr/>
         </p:nvSpPr>
@@ -15600,7 +15757,7 @@
       </p:sp>
       <p:sp>
         <p:nvSpPr>
-          <p:cNvPr id="253" name="Google Shape;253;p32"/>
+          <p:cNvPr id="261" name="Google Shape;261;p33"/>
           <p:cNvSpPr txBox="1"/>
           <p:nvPr/>
         </p:nvSpPr>
@@ -15674,7 +15831,7 @@
       </p:sp>
       <p:sp>
         <p:nvSpPr>
-          <p:cNvPr id="254" name="Google Shape;254;p32"/>
+          <p:cNvPr id="262" name="Google Shape;262;p33"/>
           <p:cNvSpPr/>
           <p:nvPr/>
         </p:nvSpPr>
@@ -15728,10 +15885,10 @@
       </p:sp>
       <p:cxnSp>
         <p:nvCxnSpPr>
-          <p:cNvPr id="255" name="Google Shape;255;p32"/>
+          <p:cNvPr id="263" name="Google Shape;263;p33"/>
           <p:cNvCxnSpPr>
-            <a:stCxn id="248" idx="2"/>
-            <a:endCxn id="254" idx="0"/>
+            <a:stCxn id="256" idx="2"/>
+            <a:endCxn id="262" idx="0"/>
           </p:cNvCxnSpPr>
           <p:nvPr/>
         </p:nvCxnSpPr>
@@ -15757,7 +15914,7 @@
       </p:cxnSp>
       <p:sp>
         <p:nvSpPr>
-          <p:cNvPr id="256" name="Google Shape;256;p32"/>
+          <p:cNvPr id="264" name="Google Shape;264;p33"/>
           <p:cNvSpPr txBox="1"/>
           <p:nvPr/>
         </p:nvSpPr>
@@ -15855,7 +16012,7 @@
       </p:sp>
       <p:sp>
         <p:nvSpPr>
-          <p:cNvPr id="257" name="Google Shape;257;p32"/>
+          <p:cNvPr id="265" name="Google Shape;265;p33"/>
           <p:cNvSpPr/>
           <p:nvPr/>
         </p:nvSpPr>
@@ -15921,10 +16078,10 @@
       </p:sp>
       <p:cxnSp>
         <p:nvCxnSpPr>
-          <p:cNvPr id="258" name="Google Shape;258;p32"/>
+          <p:cNvPr id="266" name="Google Shape;266;p33"/>
           <p:cNvCxnSpPr>
-            <a:stCxn id="254" idx="2"/>
-            <a:endCxn id="257" idx="0"/>
+            <a:stCxn id="262" idx="2"/>
+            <a:endCxn id="265" idx="0"/>
           </p:cNvCxnSpPr>
           <p:nvPr/>
         </p:nvCxnSpPr>
@@ -15950,7 +16107,7 @@
       </p:cxnSp>
       <p:sp>
         <p:nvSpPr>
-          <p:cNvPr id="259" name="Google Shape;259;p32"/>
+          <p:cNvPr id="267" name="Google Shape;267;p33"/>
           <p:cNvSpPr txBox="1"/>
           <p:nvPr/>
         </p:nvSpPr>
@@ -16024,7 +16181,7 @@
       </p:sp>
       <p:sp>
         <p:nvSpPr>
-          <p:cNvPr id="250" name="Google Shape;250;p32"/>
+          <p:cNvPr id="258" name="Google Shape;258;p33"/>
           <p:cNvSpPr/>
           <p:nvPr/>
         </p:nvSpPr>
@@ -16078,7 +16235,7 @@
       </p:sp>
       <p:pic>
         <p:nvPicPr>
-          <p:cNvPr id="260" name="Google Shape;260;p32"/>
+          <p:cNvPr id="268" name="Google Shape;268;p33"/>
           <p:cNvPicPr preferRelativeResize="0"/>
           <p:nvPr/>
         </p:nvPicPr>
@@ -16106,9 +16263,9 @@
       </p:pic>
       <p:cxnSp>
         <p:nvCxnSpPr>
-          <p:cNvPr id="261" name="Google Shape;261;p32"/>
+          <p:cNvPr id="269" name="Google Shape;269;p33"/>
           <p:cNvCxnSpPr>
-            <a:endCxn id="250" idx="0"/>
+            <a:endCxn id="258" idx="0"/>
           </p:cNvCxnSpPr>
           <p:nvPr/>
         </p:nvCxnSpPr>
@@ -16134,7 +16291,7 @@
       </p:cxnSp>
       <p:sp>
         <p:nvSpPr>
-          <p:cNvPr id="262" name="Google Shape;262;p32"/>
+          <p:cNvPr id="270" name="Google Shape;270;p33"/>
           <p:cNvSpPr txBox="1"/>
           <p:nvPr/>
         </p:nvSpPr>
@@ -16206,159 +16363,6 @@
           </a:p>
         </p:txBody>
       </p:sp>
-      <p:pic>
-        <p:nvPicPr>
-          <p:cNvPr id="263" name="Google Shape;263;p32"/>
-          <p:cNvPicPr preferRelativeResize="0"/>
-          <p:nvPr/>
-        </p:nvPicPr>
-        <p:blipFill>
-          <a:blip r:embed="rId4">
-            <a:alphaModFix/>
-          </a:blip>
-          <a:stretch>
-            <a:fillRect/>
-          </a:stretch>
-        </p:blipFill>
-        <p:spPr>
-          <a:xfrm>
-            <a:off x="3034150" y="1771875"/>
-            <a:ext cx="5078754" cy="3371625"/>
-          </a:xfrm>
-          <a:prstGeom prst="rect">
-            <a:avLst/>
-          </a:prstGeom>
-          <a:noFill/>
-          <a:ln>
-            <a:noFill/>
-          </a:ln>
-        </p:spPr>
-      </p:pic>
-      <p:pic>
-        <p:nvPicPr>
-          <p:cNvPr id="264" name="Google Shape;264;p32"/>
-          <p:cNvPicPr preferRelativeResize="0"/>
-          <p:nvPr/>
-        </p:nvPicPr>
-        <p:blipFill>
-          <a:blip r:embed="rId5">
-            <a:alphaModFix/>
-          </a:blip>
-          <a:stretch>
-            <a:fillRect/>
-          </a:stretch>
-        </p:blipFill>
-        <p:spPr>
-          <a:xfrm>
-            <a:off x="1972100" y="349000"/>
-            <a:ext cx="7202850" cy="219450"/>
-          </a:xfrm>
-          <a:prstGeom prst="rect">
-            <a:avLst/>
-          </a:prstGeom>
-          <a:noFill/>
-          <a:ln>
-            <a:noFill/>
-          </a:ln>
-        </p:spPr>
-      </p:pic>
-    </p:spTree>
-  </p:cSld>
-  <p:clrMapOvr>
-    <a:masterClrMapping/>
-  </p:clrMapOvr>
-</p:sld>
-</file>
-
-<file path=ppt/slides/slide21.xml><?xml version="1.0" encoding="utf-8"?>
-<p:sld xmlns:a="http://schemas.openxmlformats.org/drawingml/2006/main" xmlns:r="http://schemas.openxmlformats.org/officeDocument/2006/relationships" xmlns:mc="http://schemas.openxmlformats.org/markup-compatibility/2006" xmlns:mv="urn:schemas-microsoft-com:mac:vml" xmlns:p="http://schemas.openxmlformats.org/presentationml/2006/main" xmlns:c="http://schemas.openxmlformats.org/drawingml/2006/chart" xmlns:dgm="http://schemas.openxmlformats.org/drawingml/2006/diagram" xmlns:o="urn:schemas-microsoft-com:office:office" xmlns:v="urn:schemas-microsoft-com:vml" xmlns:pvml="urn:schemas-microsoft-com:office:powerpoint" xmlns:com="http://schemas.openxmlformats.org/drawingml/2006/compatibility" xmlns:p14="http://schemas.microsoft.com/office/powerpoint/2010/main" xmlns:p15="http://schemas.microsoft.com/office/powerpoint/2012/main" xmlns:ahyp="http://schemas.microsoft.com/office/drawing/2018/hyperlinkcolor">
-  <p:cSld>
-    <p:spTree>
-      <p:nvGrpSpPr>
-        <p:cNvPr id="268" name="Shape 268"/>
-        <p:cNvGrpSpPr/>
-        <p:nvPr/>
-      </p:nvGrpSpPr>
-      <p:grpSpPr>
-        <a:xfrm>
-          <a:off x="0" y="0"/>
-          <a:ext cx="0" cy="0"/>
-          <a:chOff x="0" y="0"/>
-          <a:chExt cx="0" cy="0"/>
-        </a:xfrm>
-      </p:grpSpPr>
-      <p:sp>
-        <p:nvSpPr>
-          <p:cNvPr id="269" name="Google Shape;269;p33"/>
-          <p:cNvSpPr txBox="1"/>
-          <p:nvPr>
-            <p:ph type="title"/>
-          </p:nvPr>
-        </p:nvSpPr>
-        <p:spPr>
-          <a:xfrm>
-            <a:off x="50" y="0"/>
-            <a:ext cx="9144000" cy="413100"/>
-          </a:xfrm>
-          <a:prstGeom prst="rect">
-            <a:avLst/>
-          </a:prstGeom>
-        </p:spPr>
-        <p:txBody>
-          <a:bodyPr anchorCtr="0" anchor="ctr" bIns="91425" lIns="91425" spcFirstLastPara="1" rIns="91425" wrap="square" tIns="91425">
-            <a:noAutofit/>
-          </a:bodyPr>
-          <a:lstStyle/>
-          <a:p>
-            <a:pPr indent="0" lvl="0" marL="0" rtl="0" algn="l">
-              <a:spcBef>
-                <a:spcPts val="0"/>
-              </a:spcBef>
-              <a:spcAft>
-                <a:spcPts val="0"/>
-              </a:spcAft>
-              <a:buNone/>
-            </a:pPr>
-            <a:r>
-              <a:rPr lang="fr" sz="2300"/>
-              <a:t>d</a:t>
-            </a:r>
-            <a:r>
-              <a:rPr lang="fr" sz="2300"/>
-              <a:t>) Serving layer: MongoDB : </a:t>
-            </a:r>
-            <a:endParaRPr b="0" sz="1300"/>
-          </a:p>
-        </p:txBody>
-      </p:sp>
-      <p:pic>
-        <p:nvPicPr>
-          <p:cNvPr id="270" name="Google Shape;270;p33"/>
-          <p:cNvPicPr preferRelativeResize="0"/>
-          <p:nvPr/>
-        </p:nvPicPr>
-        <p:blipFill>
-          <a:blip r:embed="rId3">
-            <a:alphaModFix/>
-          </a:blip>
-          <a:stretch>
-            <a:fillRect/>
-          </a:stretch>
-        </p:blipFill>
-        <p:spPr>
-          <a:xfrm>
-            <a:off x="6180275" y="2680475"/>
-            <a:ext cx="2963725" cy="2300350"/>
-          </a:xfrm>
-          <a:prstGeom prst="rect">
-            <a:avLst/>
-          </a:prstGeom>
-          <a:noFill/>
-          <a:ln>
-            <a:noFill/>
-          </a:ln>
-        </p:spPr>
-      </p:pic>
       <p:pic>
         <p:nvPicPr>
           <p:cNvPr id="271" name="Google Shape;271;p33"/>
@@ -16375,8 +16379,8 @@
         </p:blipFill>
         <p:spPr>
           <a:xfrm>
-            <a:off x="-72875" y="1426775"/>
-            <a:ext cx="5942200" cy="3787325"/>
+            <a:off x="3034150" y="1771875"/>
+            <a:ext cx="5078754" cy="3371625"/>
           </a:xfrm>
           <a:prstGeom prst="rect">
             <a:avLst/>
@@ -16403,8 +16407,8 @@
         </p:blipFill>
         <p:spPr>
           <a:xfrm>
-            <a:off x="3667113" y="93275"/>
-            <a:ext cx="5476875" cy="1333500"/>
+            <a:off x="1972100" y="349000"/>
+            <a:ext cx="7202850" cy="219450"/>
           </a:xfrm>
           <a:prstGeom prst="rect">
             <a:avLst/>
@@ -17197,7 +17201,7 @@
             <a:tbl>
               <a:tblPr>
                 <a:noFill/>
-                <a:tableStyleId>{BEAC889E-2F38-43EB-AEAD-78A951F6EF2A}</a:tableStyleId>
+                <a:tableStyleId>{4949FA1E-4ED2-4D9C-9586-1FDE16C5F10C}</a:tableStyleId>
               </a:tblPr>
               <a:tblGrid>
                 <a:gridCol w="1137875"/>
@@ -17636,7 +17640,7 @@
                       </a:pPr>
                       <a:r>
                         <a:rPr lang="fr"/>
-                        <a:t>Utiliser des outils de supervison (supervisor) pour </a:t>
+                        <a:t>Utiliser des outils de supervision (supervisord) pour </a:t>
                       </a:r>
                       <a:r>
                         <a:rPr lang="fr">
@@ -17992,7 +17996,15 @@
                   <a:srgbClr val="6AA84F"/>
                 </a:solidFill>
               </a:rPr>
-              <a:t>$ ./bin/kafka-topics.sh --create --zookeeper localhost:2181 --replication-factor 2 --partitions 1 --topic bitcoin-price</a:t>
+              <a:t>$ ./bin/kafka-topics.sh --create --zookeeper localhost:2181 --replication-factor 2 --partitions 1 --topic </a:t>
+            </a:r>
+            <a:r>
+              <a:rPr i="1" lang="fr" sz="1200">
+                <a:solidFill>
+                  <a:srgbClr val="6AA84F"/>
+                </a:solidFill>
+              </a:rPr>
+              <a:t>tweetsTopic</a:t>
             </a:r>
             <a:endParaRPr i="1" sz="1200">
               <a:solidFill>
@@ -18117,39 +18129,179 @@
           <p:cNvPr id="98" name="Google Shape;98;p15"/>
           <p:cNvSpPr txBox="1"/>
           <p:nvPr>
-            <p:ph idx="4294967295" type="title"/>
+            <p:ph idx="4294967295" type="body"/>
           </p:nvPr>
         </p:nvSpPr>
         <p:spPr>
           <a:xfrm>
-            <a:off x="1338150" y="98025"/>
-            <a:ext cx="5219400" cy="327600"/>
+            <a:off x="100100" y="525550"/>
+            <a:ext cx="8710200" cy="4355100"/>
           </a:xfrm>
           <a:prstGeom prst="rect">
             <a:avLst/>
           </a:prstGeom>
         </p:spPr>
         <p:txBody>
-          <a:bodyPr anchorCtr="0" anchor="ctr" bIns="91425" lIns="91425" spcFirstLastPara="1" rIns="91425" wrap="square" tIns="91425">
+          <a:bodyPr anchorCtr="0" anchor="t" bIns="91425" lIns="91425" spcFirstLastPara="1" rIns="91425" wrap="square" tIns="91425">
             <a:noAutofit/>
           </a:bodyPr>
           <a:lstStyle/>
           <a:p>
-            <a:pPr indent="-419100" lvl="0" marL="457200" rtl="0" algn="l">
-              <a:spcBef>
-                <a:spcPts val="0"/>
-              </a:spcBef>
-              <a:spcAft>
-                <a:spcPts val="0"/>
-              </a:spcAft>
-              <a:buSzPts val="3000"/>
-              <a:buAutoNum type="arabicPeriod"/>
-            </a:pPr>
+            <a:pPr indent="-317500" lvl="0" marL="457200" rtl="0" algn="l">
+              <a:spcBef>
+                <a:spcPts val="0"/>
+              </a:spcBef>
+              <a:spcAft>
+                <a:spcPts val="0"/>
+              </a:spcAft>
+              <a:buSzPts val="1400"/>
+              <a:buChar char="●"/>
+            </a:pPr>
+            <a:r>
+              <a:rPr lang="fr" sz="1400"/>
+              <a:t>Dans les sociétés dont l’activité est pilotée par des informations, les données constituent une ressource d’information crucial et source de vérité, donc il ne faut pas les perdre.</a:t>
+            </a:r>
+            <a:endParaRPr sz="1400"/>
+          </a:p>
+          <a:p>
+            <a:pPr indent="0" lvl="0" marL="457200" rtl="0" algn="l">
+              <a:spcBef>
+                <a:spcPts val="1600"/>
+              </a:spcBef>
+              <a:spcAft>
+                <a:spcPts val="0"/>
+              </a:spcAft>
+              <a:buNone/>
+            </a:pPr>
+            <a:r>
+              <a:t/>
+            </a:r>
+            <a:endParaRPr sz="1400"/>
+          </a:p>
+          <a:p>
+            <a:pPr indent="-317500" lvl="0" marL="457200" rtl="0" algn="l">
+              <a:spcBef>
+                <a:spcPts val="1600"/>
+              </a:spcBef>
+              <a:spcAft>
+                <a:spcPts val="0"/>
+              </a:spcAft>
+              <a:buSzPts val="1400"/>
+              <a:buChar char="●"/>
+            </a:pPr>
+            <a:r>
+              <a:rPr lang="fr" sz="1400"/>
+              <a:t>Suivant les cas, il peut être nécessaire d’avoir l’état de la situation en temps-réel afin de pouvoir anticiper certaines choses alors que des traitement plus précis peuvent prendre beaucoup de temps </a:t>
+            </a:r>
+            <a:endParaRPr sz="1400"/>
+          </a:p>
+          <a:p>
+            <a:pPr indent="0" lvl="0" marL="457200" rtl="0" algn="l">
+              <a:spcBef>
+                <a:spcPts val="1600"/>
+              </a:spcBef>
+              <a:spcAft>
+                <a:spcPts val="0"/>
+              </a:spcAft>
+              <a:buNone/>
+            </a:pPr>
+            <a:r>
+              <a:t/>
+            </a:r>
+            <a:endParaRPr sz="1400"/>
+          </a:p>
+          <a:p>
+            <a:pPr indent="-317500" lvl="0" marL="457200" rtl="0" algn="l">
+              <a:spcBef>
+                <a:spcPts val="1600"/>
+              </a:spcBef>
+              <a:spcAft>
+                <a:spcPts val="0"/>
+              </a:spcAft>
+              <a:buSzPts val="1400"/>
+              <a:buChar char="●"/>
+            </a:pPr>
+            <a:r>
+              <a:rPr lang="fr" sz="1400"/>
+              <a:t>C’est dans cette optique que l’architecture lambda répond à ces besoins en permettant:</a:t>
+            </a:r>
+            <a:endParaRPr sz="1400"/>
+          </a:p>
+          <a:p>
+            <a:pPr indent="-317500" lvl="2" marL="1371600" rtl="0" algn="l">
+              <a:spcBef>
+                <a:spcPts val="0"/>
+              </a:spcBef>
+              <a:spcAft>
+                <a:spcPts val="0"/>
+              </a:spcAft>
+              <a:buSzPts val="1400"/>
+              <a:buChar char="■"/>
+            </a:pPr>
+            <a:r>
+              <a:rPr lang="fr"/>
+              <a:t>Temps de traitement acceptable ~ temps réel</a:t>
+            </a:r>
+            <a:endParaRPr/>
+          </a:p>
+          <a:p>
+            <a:pPr indent="-317500" lvl="2" marL="1371600" rtl="0" algn="l">
+              <a:spcBef>
+                <a:spcPts val="0"/>
+              </a:spcBef>
+              <a:spcAft>
+                <a:spcPts val="0"/>
+              </a:spcAft>
+              <a:buSzPts val="1400"/>
+              <a:buChar char="■"/>
+            </a:pPr>
+            <a:r>
+              <a:rPr lang="fr"/>
+              <a:t>Supporter des quantités de charges qui peuvent êtres énormes</a:t>
+            </a:r>
+            <a:endParaRPr/>
+          </a:p>
+          <a:p>
+            <a:pPr indent="-317500" lvl="2" marL="1371600" rtl="0" algn="l">
+              <a:spcBef>
+                <a:spcPts val="0"/>
+              </a:spcBef>
+              <a:spcAft>
+                <a:spcPts val="0"/>
+              </a:spcAft>
+              <a:buSzPts val="1400"/>
+              <a:buChar char="■"/>
+            </a:pPr>
+            <a:r>
+              <a:rPr lang="fr"/>
+              <a:t>Prise des précautions nécessaires pour </a:t>
+            </a:r>
             <a:r>
               <a:rPr b="1" lang="fr"/>
-              <a:t>Introduction:</a:t>
-            </a:r>
-            <a:endParaRPr b="1" sz="2000"/>
+              <a:t>ne pas perdre de données</a:t>
+            </a:r>
+            <a:endParaRPr b="1"/>
+          </a:p>
+          <a:p>
+            <a:pPr indent="-317500" lvl="2" marL="1371600" rtl="0" algn="l">
+              <a:spcBef>
+                <a:spcPts val="0"/>
+              </a:spcBef>
+              <a:spcAft>
+                <a:spcPts val="0"/>
+              </a:spcAft>
+              <a:buSzPts val="1400"/>
+              <a:buChar char="■"/>
+            </a:pPr>
+            <a:r>
+              <a:rPr lang="fr"/>
+              <a:t>Protéger contre les </a:t>
+            </a:r>
+            <a:r>
+              <a:rPr b="1" lang="fr"/>
+              <a:t>pannes et erreurs</a:t>
+            </a:r>
+            <a:endParaRPr b="1"/>
           </a:p>
         </p:txBody>
       </p:sp>
@@ -18158,179 +18310,39 @@
           <p:cNvPr id="99" name="Google Shape;99;p15"/>
           <p:cNvSpPr txBox="1"/>
           <p:nvPr>
-            <p:ph idx="4294967295" type="body"/>
+            <p:ph idx="4294967295" type="title"/>
           </p:nvPr>
         </p:nvSpPr>
         <p:spPr>
           <a:xfrm>
-            <a:off x="100100" y="525550"/>
-            <a:ext cx="8710200" cy="4355100"/>
+            <a:off x="1338150" y="98025"/>
+            <a:ext cx="5219400" cy="327600"/>
           </a:xfrm>
           <a:prstGeom prst="rect">
             <a:avLst/>
           </a:prstGeom>
         </p:spPr>
         <p:txBody>
-          <a:bodyPr anchorCtr="0" anchor="t" bIns="91425" lIns="91425" spcFirstLastPara="1" rIns="91425" wrap="square" tIns="91425">
+          <a:bodyPr anchorCtr="0" anchor="ctr" bIns="91425" lIns="91425" spcFirstLastPara="1" rIns="91425" wrap="square" tIns="91425">
             <a:noAutofit/>
           </a:bodyPr>
           <a:lstStyle/>
           <a:p>
-            <a:pPr indent="-317500" lvl="0" marL="457200" rtl="0" algn="l">
-              <a:spcBef>
-                <a:spcPts val="0"/>
-              </a:spcBef>
-              <a:spcAft>
-                <a:spcPts val="0"/>
-              </a:spcAft>
-              <a:buSzPts val="1400"/>
-              <a:buChar char="●"/>
-            </a:pPr>
-            <a:r>
-              <a:rPr lang="fr" sz="1400"/>
-              <a:t>Dans les sociétés dont l’activité est pilotée par des informations, les données constituent une ressource d’informations crucial</a:t>
-            </a:r>
-            <a:endParaRPr sz="1400"/>
-          </a:p>
-          <a:p>
-            <a:pPr indent="0" lvl="0" marL="457200" rtl="0" algn="l">
-              <a:spcBef>
-                <a:spcPts val="1600"/>
-              </a:spcBef>
-              <a:spcAft>
-                <a:spcPts val="0"/>
-              </a:spcAft>
-              <a:buNone/>
-            </a:pPr>
-            <a:r>
-              <a:t/>
-            </a:r>
-            <a:endParaRPr sz="1400"/>
-          </a:p>
-          <a:p>
-            <a:pPr indent="-317500" lvl="0" marL="457200" rtl="0" algn="l">
-              <a:spcBef>
-                <a:spcPts val="1600"/>
-              </a:spcBef>
-              <a:spcAft>
-                <a:spcPts val="0"/>
-              </a:spcAft>
-              <a:buSzPts val="1400"/>
-              <a:buChar char="●"/>
-            </a:pPr>
-            <a:r>
-              <a:rPr lang="fr" sz="1400"/>
-              <a:t>Traiter les données en temps-réel permet d’avoir un premier aperçu de la situation ce qui permet d’anticiper une situation avant d’avoir un résultat dont le traitement peut prendre du temps</a:t>
-            </a:r>
-            <a:endParaRPr sz="1400"/>
-          </a:p>
-          <a:p>
-            <a:pPr indent="0" lvl="0" marL="457200" rtl="0" algn="l">
-              <a:spcBef>
-                <a:spcPts val="1600"/>
-              </a:spcBef>
-              <a:spcAft>
-                <a:spcPts val="0"/>
-              </a:spcAft>
-              <a:buNone/>
-            </a:pPr>
-            <a:r>
-              <a:t/>
-            </a:r>
-            <a:endParaRPr sz="1400"/>
-          </a:p>
-          <a:p>
-            <a:pPr indent="-317500" lvl="0" marL="457200" rtl="0" algn="l">
-              <a:spcBef>
-                <a:spcPts val="1600"/>
-              </a:spcBef>
-              <a:spcAft>
-                <a:spcPts val="0"/>
-              </a:spcAft>
-              <a:buSzPts val="1400"/>
-              <a:buChar char="●"/>
-            </a:pPr>
-            <a:r>
-              <a:rPr lang="fr" sz="1400"/>
-              <a:t>L’exploitation optimum des données prend donc en compte:</a:t>
-            </a:r>
-            <a:endParaRPr sz="1400"/>
-          </a:p>
-          <a:p>
-            <a:pPr indent="-317500" lvl="2" marL="1371600" rtl="0" algn="l">
-              <a:spcBef>
-                <a:spcPts val="0"/>
-              </a:spcBef>
-              <a:spcAft>
-                <a:spcPts val="0"/>
-              </a:spcAft>
-              <a:buSzPts val="1400"/>
-              <a:buChar char="■"/>
-            </a:pPr>
-            <a:r>
-              <a:rPr lang="fr"/>
-              <a:t>Temps de traitement acceptable ~ temps réel</a:t>
-            </a:r>
-            <a:endParaRPr/>
-          </a:p>
-          <a:p>
-            <a:pPr indent="-317500" lvl="2" marL="1371600" rtl="0" algn="l">
-              <a:spcBef>
-                <a:spcPts val="0"/>
-              </a:spcBef>
-              <a:spcAft>
-                <a:spcPts val="0"/>
-              </a:spcAft>
-              <a:buSzPts val="1400"/>
-              <a:buChar char="■"/>
-            </a:pPr>
-            <a:r>
-              <a:rPr lang="fr"/>
-              <a:t>Déploiement: Mobiliser les ressources et les infrastructures capable de supporter des quantités qui peuvent êtres énormes</a:t>
-            </a:r>
-            <a:endParaRPr/>
-          </a:p>
-          <a:p>
-            <a:pPr indent="-317500" lvl="2" marL="1371600" rtl="0" algn="l">
-              <a:spcBef>
-                <a:spcPts val="0"/>
-              </a:spcBef>
-              <a:spcAft>
-                <a:spcPts val="0"/>
-              </a:spcAft>
-              <a:buSzPts val="1400"/>
-              <a:buChar char="■"/>
-            </a:pPr>
-            <a:r>
-              <a:rPr lang="fr"/>
-              <a:t>Prendre les précautions nécessaire pour </a:t>
-            </a:r>
+            <a:pPr indent="-419100" lvl="0" marL="457200" rtl="0" algn="l">
+              <a:spcBef>
+                <a:spcPts val="0"/>
+              </a:spcBef>
+              <a:spcAft>
+                <a:spcPts val="0"/>
+              </a:spcAft>
+              <a:buSzPts val="3000"/>
+              <a:buAutoNum type="arabicPeriod"/>
+            </a:pPr>
             <a:r>
               <a:rPr b="1" lang="fr"/>
-              <a:t>ne pas perdres de données</a:t>
-            </a:r>
-            <a:endParaRPr b="1"/>
-          </a:p>
-          <a:p>
-            <a:pPr indent="-317500" lvl="2" marL="1371600" rtl="0" algn="l">
-              <a:spcBef>
-                <a:spcPts val="0"/>
-              </a:spcBef>
-              <a:spcAft>
-                <a:spcPts val="0"/>
-              </a:spcAft>
-              <a:buSzPts val="1400"/>
-              <a:buChar char="■"/>
-            </a:pPr>
-            <a:r>
-              <a:rPr lang="fr"/>
-              <a:t>Traitement en continue ==&gt; se protéger contre les </a:t>
-            </a:r>
-            <a:r>
-              <a:rPr b="1" lang="fr"/>
-              <a:t>pannes et érreurs</a:t>
-            </a:r>
-            <a:endParaRPr b="1"/>
+              <a:t>Introduction:</a:t>
+            </a:r>
+            <a:endParaRPr b="1" sz="2000"/>
           </a:p>
         </p:txBody>
       </p:sp>
@@ -18374,7 +18386,7 @@
             <a:tbl>
               <a:tblPr>
                 <a:noFill/>
-                <a:tableStyleId>{BEAC889E-2F38-43EB-AEAD-78A951F6EF2A}</a:tableStyleId>
+                <a:tableStyleId>{4949FA1E-4ED2-4D9C-9586-1FDE16C5F10C}</a:tableStyleId>
               </a:tblPr>
               <a:tblGrid>
                 <a:gridCol w="1125975"/>
@@ -19717,7 +19729,7 @@
         <p:spPr>
           <a:xfrm>
             <a:off x="456725" y="475500"/>
-            <a:ext cx="7884300" cy="3416400"/>
+            <a:ext cx="7884300" cy="3329100"/>
           </a:xfrm>
           <a:prstGeom prst="rect">
             <a:avLst/>
@@ -19896,7 +19908,7 @@
             </a:pPr>
             <a:r>
               <a:rPr lang="fr" sz="1700"/>
-              <a:t>Interdire l’accès en écriture sur les deux répertoire contenant les données brutes et données sérialisés (master dataset):</a:t>
+              <a:t>Interdire l’accès en écriture sur les répertoires contenant les données sérialisés :</a:t>
             </a:r>
             <a:endParaRPr sz="1700"/>
           </a:p>
@@ -19921,7 +19933,7 @@
                   <a:srgbClr val="38761D"/>
                 </a:solidFill>
               </a:rPr>
-              <a:t>hdfs dfs -chmod -R ugo-w /data/twitter/master/full</a:t>
+              <a:t>hdfs dfs -chmod -R ugo-w /data/twitter/full/date=2020-09-02</a:t>
             </a:r>
             <a:endParaRPr sz="1700"/>
           </a:p>
@@ -19943,8 +19955,8 @@
         </p:blipFill>
         <p:spPr>
           <a:xfrm>
-            <a:off x="0" y="3816950"/>
-            <a:ext cx="9144000" cy="1326550"/>
+            <a:off x="0" y="3804600"/>
+            <a:ext cx="9144000" cy="1338900"/>
           </a:xfrm>
           <a:prstGeom prst="rect">
             <a:avLst/>
@@ -20169,7 +20181,7 @@
             <a:tbl>
               <a:tblPr>
                 <a:noFill/>
-                <a:tableStyleId>{BEAC889E-2F38-43EB-AEAD-78A951F6EF2A}</a:tableStyleId>
+                <a:tableStyleId>{4949FA1E-4ED2-4D9C-9586-1FDE16C5F10C}</a:tableStyleId>
               </a:tblPr>
               <a:tblGrid>
                 <a:gridCol w="1000225"/>
@@ -20514,7 +20526,7 @@
                             <a:srgbClr val="000000"/>
                           </a:solidFill>
                         </a:rPr>
-                        <a:t>répartir les charges s</a:t>
+                        <a:t>répartir les charges </a:t>
                       </a:r>
                       <a:r>
                         <a:rPr lang="fr"/>
@@ -21114,8 +21126,8 @@
         </p:nvSpPr>
         <p:spPr>
           <a:xfrm>
-            <a:off x="650750" y="0"/>
-            <a:ext cx="8493300" cy="565200"/>
+            <a:off x="4855675" y="0"/>
+            <a:ext cx="4288200" cy="475500"/>
           </a:xfrm>
           <a:prstGeom prst="rect">
             <a:avLst/>
@@ -21127,712 +21139,55 @@
           </a:bodyPr>
           <a:lstStyle/>
           <a:p>
-            <a:pPr indent="0" lvl="0" marL="0" rtl="0" algn="l">
-              <a:spcBef>
-                <a:spcPts val="0"/>
-              </a:spcBef>
-              <a:spcAft>
-                <a:spcPts val="0"/>
-              </a:spcAft>
-              <a:buNone/>
-            </a:pPr>
-            <a:r>
-              <a:rPr lang="fr"/>
-              <a:t>a) Structure de notre data lake: </a:t>
-            </a:r>
-            <a:endParaRPr b="0" sz="2000"/>
+            <a:pPr indent="457200" lvl="0" marL="0" rtl="0" algn="ctr">
+              <a:spcBef>
+                <a:spcPts val="0"/>
+              </a:spcBef>
+              <a:spcAft>
+                <a:spcPts val="0"/>
+              </a:spcAft>
+              <a:buNone/>
+            </a:pPr>
+            <a:r>
+              <a:rPr lang="fr" sz="2100"/>
+              <a:t>c</a:t>
+            </a:r>
+            <a:r>
+              <a:rPr lang="fr" sz="2100"/>
+              <a:t>) Démarrage kafka-manager:</a:t>
+            </a:r>
+            <a:endParaRPr b="0" sz="1100"/>
           </a:p>
         </p:txBody>
       </p:sp>
-      <p:sp>
-        <p:nvSpPr>
+      <p:pic>
+        <p:nvPicPr>
           <p:cNvPr id="374" name="Google Shape;374;p49"/>
-          <p:cNvSpPr txBox="1"/>
-          <p:nvPr>
-            <p:ph idx="1" type="body"/>
-          </p:nvPr>
-        </p:nvSpPr>
-        <p:spPr>
-          <a:xfrm>
-            <a:off x="0" y="488075"/>
-            <a:ext cx="9060600" cy="4542900"/>
+          <p:cNvPicPr preferRelativeResize="0"/>
+          <p:nvPr/>
+        </p:nvPicPr>
+        <p:blipFill>
+          <a:blip r:embed="rId3">
+            <a:alphaModFix/>
+          </a:blip>
+          <a:stretch>
+            <a:fillRect/>
+          </a:stretch>
+        </p:blipFill>
+        <p:spPr>
+          <a:xfrm>
+            <a:off x="0" y="-50075"/>
+            <a:ext cx="5227816" cy="5143501"/>
           </a:xfrm>
           <a:prstGeom prst="rect">
             <a:avLst/>
           </a:prstGeom>
-        </p:spPr>
-        <p:txBody>
-          <a:bodyPr anchorCtr="0" anchor="t" bIns="91425" lIns="91425" spcFirstLastPara="1" rIns="91425" wrap="square" tIns="91425">
-            <a:noAutofit/>
-          </a:bodyPr>
-          <a:lstStyle/>
-          <a:p>
-            <a:pPr indent="-317500" lvl="0" marL="457200" rtl="0" algn="l">
-              <a:spcBef>
-                <a:spcPts val="0"/>
-              </a:spcBef>
-              <a:spcAft>
-                <a:spcPts val="0"/>
-              </a:spcAft>
-              <a:buSzPts val="1400"/>
-              <a:buChar char="●"/>
-            </a:pPr>
-            <a:r>
-              <a:rPr b="1" lang="fr" sz="1200">
-                <a:solidFill>
-                  <a:srgbClr val="000000"/>
-                </a:solidFill>
-                <a:latin typeface="Arial"/>
-                <a:ea typeface="Arial"/>
-                <a:cs typeface="Arial"/>
-                <a:sym typeface="Arial"/>
-              </a:rPr>
-              <a:t>/data/</a:t>
-            </a:r>
-            <a:r>
-              <a:rPr lang="fr" sz="1200">
-                <a:solidFill>
-                  <a:srgbClr val="000000"/>
-                </a:solidFill>
-                <a:latin typeface="Arial"/>
-                <a:ea typeface="Arial"/>
-                <a:cs typeface="Arial"/>
-                <a:sym typeface="Arial"/>
-              </a:rPr>
-              <a:t> : Contient tous nos données</a:t>
-            </a:r>
-            <a:endParaRPr sz="1200">
-              <a:solidFill>
-                <a:srgbClr val="000000"/>
-              </a:solidFill>
-              <a:latin typeface="Arial"/>
-              <a:ea typeface="Arial"/>
-              <a:cs typeface="Arial"/>
-              <a:sym typeface="Arial"/>
-            </a:endParaRPr>
-          </a:p>
-          <a:p>
-            <a:pPr indent="-317500" lvl="0" marL="457200" rtl="0" algn="l">
-              <a:spcBef>
-                <a:spcPts val="0"/>
-              </a:spcBef>
-              <a:spcAft>
-                <a:spcPts val="0"/>
-              </a:spcAft>
-              <a:buSzPts val="1400"/>
-              <a:buChar char="●"/>
-            </a:pPr>
-            <a:r>
-              <a:rPr b="1" lang="fr" sz="1200">
-                <a:solidFill>
-                  <a:srgbClr val="000000"/>
-                </a:solidFill>
-                <a:latin typeface="Arial"/>
-                <a:ea typeface="Arial"/>
-                <a:cs typeface="Arial"/>
-                <a:sym typeface="Arial"/>
-              </a:rPr>
-              <a:t>/data/.snapshot/s20200720-163848.488/*</a:t>
-            </a:r>
-            <a:r>
-              <a:rPr lang="fr" sz="1200">
-                <a:solidFill>
-                  <a:srgbClr val="000000"/>
-                </a:solidFill>
-                <a:latin typeface="Arial"/>
-                <a:ea typeface="Arial"/>
-                <a:cs typeface="Arial"/>
-                <a:sym typeface="Arial"/>
-              </a:rPr>
-              <a:t> : contient le snapshot de tous nos données</a:t>
-            </a:r>
-            <a:endParaRPr sz="1200">
-              <a:solidFill>
-                <a:srgbClr val="000000"/>
-              </a:solidFill>
-              <a:latin typeface="Arial"/>
-              <a:ea typeface="Arial"/>
-              <a:cs typeface="Arial"/>
-              <a:sym typeface="Arial"/>
-            </a:endParaRPr>
-          </a:p>
-          <a:p>
-            <a:pPr indent="-317500" lvl="0" marL="457200" rtl="0" algn="l">
-              <a:spcBef>
-                <a:spcPts val="0"/>
-              </a:spcBef>
-              <a:spcAft>
-                <a:spcPts val="0"/>
-              </a:spcAft>
-              <a:buSzPts val="1400"/>
-              <a:buChar char="●"/>
-            </a:pPr>
-            <a:r>
-              <a:rPr b="1" lang="fr" sz="1200">
-                <a:solidFill>
-                  <a:srgbClr val="000000"/>
-                </a:solidFill>
-                <a:latin typeface="Arial"/>
-                <a:ea typeface="Arial"/>
-                <a:cs typeface="Arial"/>
-                <a:sym typeface="Arial"/>
-              </a:rPr>
-              <a:t>/data/frwiki/</a:t>
-            </a:r>
-            <a:r>
-              <a:rPr lang="fr" sz="1200">
-                <a:solidFill>
-                  <a:srgbClr val="000000"/>
-                </a:solidFill>
-                <a:latin typeface="Arial"/>
-                <a:ea typeface="Arial"/>
-                <a:cs typeface="Arial"/>
-                <a:sym typeface="Arial"/>
-              </a:rPr>
-              <a:t> : contient tout ce qui provient de Wikipedia</a:t>
-            </a:r>
-            <a:endParaRPr sz="1200">
-              <a:solidFill>
-                <a:srgbClr val="000000"/>
-              </a:solidFill>
-              <a:latin typeface="Arial"/>
-              <a:ea typeface="Arial"/>
-              <a:cs typeface="Arial"/>
-              <a:sym typeface="Arial"/>
-            </a:endParaRPr>
-          </a:p>
-          <a:p>
-            <a:pPr indent="-317500" lvl="0" marL="457200" rtl="0" algn="l">
-              <a:spcBef>
-                <a:spcPts val="0"/>
-              </a:spcBef>
-              <a:spcAft>
-                <a:spcPts val="0"/>
-              </a:spcAft>
-              <a:buSzPts val="1400"/>
-              <a:buChar char="●"/>
-            </a:pPr>
-            <a:r>
-              <a:rPr b="1" lang="fr" sz="1200">
-                <a:solidFill>
-                  <a:srgbClr val="000000"/>
-                </a:solidFill>
-                <a:latin typeface="Arial"/>
-                <a:ea typeface="Arial"/>
-                <a:cs typeface="Arial"/>
-                <a:sym typeface="Arial"/>
-              </a:rPr>
-              <a:t>/data/frwiki/raw</a:t>
-            </a:r>
-            <a:r>
-              <a:rPr lang="fr" sz="1200">
-                <a:solidFill>
-                  <a:srgbClr val="000000"/>
-                </a:solidFill>
-                <a:latin typeface="Arial"/>
-                <a:ea typeface="Arial"/>
-                <a:cs typeface="Arial"/>
-                <a:sym typeface="Arial"/>
-              </a:rPr>
-              <a:t>/ : contient tous nos données brutes</a:t>
-            </a:r>
-            <a:endParaRPr sz="1200">
-              <a:solidFill>
-                <a:srgbClr val="000000"/>
-              </a:solidFill>
-              <a:latin typeface="Arial"/>
-              <a:ea typeface="Arial"/>
-              <a:cs typeface="Arial"/>
-              <a:sym typeface="Arial"/>
-            </a:endParaRPr>
-          </a:p>
-          <a:p>
-            <a:pPr indent="-317500" lvl="0" marL="457200" rtl="0" algn="l">
-              <a:spcBef>
-                <a:spcPts val="0"/>
-              </a:spcBef>
-              <a:spcAft>
-                <a:spcPts val="0"/>
-              </a:spcAft>
-              <a:buSzPts val="1400"/>
-              <a:buChar char="●"/>
-            </a:pPr>
-            <a:r>
-              <a:rPr lang="fr" sz="1200">
-                <a:solidFill>
-                  <a:srgbClr val="6AA84F"/>
-                </a:solidFill>
-                <a:latin typeface="Arial"/>
-                <a:ea typeface="Arial"/>
-                <a:cs typeface="Arial"/>
-                <a:sym typeface="Arial"/>
-              </a:rPr>
-              <a:t>/data/frwiki/raw/frwiki-20200201-pagelinks.sql</a:t>
-            </a:r>
-            <a:r>
-              <a:rPr lang="fr" sz="1200">
-                <a:solidFill>
-                  <a:srgbClr val="000000"/>
-                </a:solidFill>
-                <a:latin typeface="Arial"/>
-                <a:ea typeface="Arial"/>
-                <a:cs typeface="Arial"/>
-                <a:sym typeface="Arial"/>
-              </a:rPr>
-              <a:t> : fichier brute contenant les liens entre les pages (11.04 GB)</a:t>
-            </a:r>
-            <a:endParaRPr sz="1200">
-              <a:solidFill>
-                <a:srgbClr val="000000"/>
-              </a:solidFill>
-              <a:latin typeface="Arial"/>
-              <a:ea typeface="Arial"/>
-              <a:cs typeface="Arial"/>
-              <a:sym typeface="Arial"/>
-            </a:endParaRPr>
-          </a:p>
-          <a:p>
-            <a:pPr indent="-317500" lvl="0" marL="457200" rtl="0" algn="l">
-              <a:spcBef>
-                <a:spcPts val="0"/>
-              </a:spcBef>
-              <a:spcAft>
-                <a:spcPts val="0"/>
-              </a:spcAft>
-              <a:buSzPts val="1400"/>
-              <a:buChar char="●"/>
-            </a:pPr>
-            <a:r>
-              <a:rPr lang="fr" sz="1200">
-                <a:solidFill>
-                  <a:srgbClr val="6AA84F"/>
-                </a:solidFill>
-                <a:latin typeface="Arial"/>
-                <a:ea typeface="Arial"/>
-                <a:cs typeface="Arial"/>
-                <a:sym typeface="Arial"/>
-              </a:rPr>
-              <a:t>/data/frwiki/raw/frwiki-20200201-stub-meta-history.xml</a:t>
-            </a:r>
-            <a:r>
-              <a:rPr lang="fr" sz="1200">
-                <a:solidFill>
-                  <a:srgbClr val="000000"/>
-                </a:solidFill>
-                <a:latin typeface="Arial"/>
-                <a:ea typeface="Arial"/>
-                <a:cs typeface="Arial"/>
-                <a:sym typeface="Arial"/>
-              </a:rPr>
-              <a:t> : fichier brute contenant les informations et historique des  pages (70.72 GB)</a:t>
-            </a:r>
-            <a:endParaRPr sz="1200">
-              <a:solidFill>
-                <a:srgbClr val="000000"/>
-              </a:solidFill>
-              <a:latin typeface="Arial"/>
-              <a:ea typeface="Arial"/>
-              <a:cs typeface="Arial"/>
-              <a:sym typeface="Arial"/>
-            </a:endParaRPr>
-          </a:p>
-          <a:p>
-            <a:pPr indent="-317500" lvl="0" marL="457200" rtl="0" algn="l">
-              <a:spcBef>
-                <a:spcPts val="0"/>
-              </a:spcBef>
-              <a:spcAft>
-                <a:spcPts val="0"/>
-              </a:spcAft>
-              <a:buSzPts val="1400"/>
-              <a:buChar char="●"/>
-            </a:pPr>
-            <a:r>
-              <a:rPr b="1" lang="fr" sz="1200">
-                <a:solidFill>
-                  <a:srgbClr val="000000"/>
-                </a:solidFill>
-                <a:latin typeface="Arial"/>
-                <a:ea typeface="Arial"/>
-                <a:cs typeface="Arial"/>
-                <a:sym typeface="Arial"/>
-              </a:rPr>
-              <a:t>/data/frwiki/frwiki-20200201/</a:t>
-            </a:r>
-            <a:r>
-              <a:rPr lang="fr" sz="1200">
-                <a:solidFill>
-                  <a:srgbClr val="000000"/>
-                </a:solidFill>
-                <a:latin typeface="Arial"/>
-                <a:ea typeface="Arial"/>
-                <a:cs typeface="Arial"/>
-                <a:sym typeface="Arial"/>
-              </a:rPr>
-              <a:t> : contient tout ce qui provient des données brutes du 1er février 2020</a:t>
-            </a:r>
-            <a:endParaRPr sz="1200">
-              <a:solidFill>
-                <a:srgbClr val="000000"/>
-              </a:solidFill>
-              <a:latin typeface="Arial"/>
-              <a:ea typeface="Arial"/>
-              <a:cs typeface="Arial"/>
-              <a:sym typeface="Arial"/>
-            </a:endParaRPr>
-          </a:p>
-          <a:p>
-            <a:pPr indent="-317500" lvl="0" marL="457200" rtl="0" algn="l">
-              <a:spcBef>
-                <a:spcPts val="0"/>
-              </a:spcBef>
-              <a:spcAft>
-                <a:spcPts val="0"/>
-              </a:spcAft>
-              <a:buSzPts val="1400"/>
-              <a:buChar char="●"/>
-            </a:pPr>
-            <a:r>
-              <a:rPr lang="fr" sz="1200">
-                <a:solidFill>
-                  <a:srgbClr val="000000"/>
-                </a:solidFill>
-                <a:latin typeface="Arial"/>
-                <a:ea typeface="Arial"/>
-                <a:cs typeface="Arial"/>
-                <a:sym typeface="Arial"/>
-              </a:rPr>
-              <a:t> </a:t>
-            </a:r>
-            <a:r>
-              <a:rPr b="1" lang="fr" sz="1200">
-                <a:solidFill>
-                  <a:srgbClr val="000000"/>
-                </a:solidFill>
-                <a:latin typeface="Arial"/>
-                <a:ea typeface="Arial"/>
-                <a:cs typeface="Arial"/>
-                <a:sym typeface="Arial"/>
-              </a:rPr>
-              <a:t>/data/frwiki/frwiki-20200201/master/</a:t>
-            </a:r>
-            <a:r>
-              <a:rPr lang="fr" sz="1200">
-                <a:solidFill>
-                  <a:srgbClr val="000000"/>
-                </a:solidFill>
-                <a:latin typeface="Arial"/>
-                <a:ea typeface="Arial"/>
-                <a:cs typeface="Arial"/>
-                <a:sym typeface="Arial"/>
-              </a:rPr>
-              <a:t> : contient tous les jeux de données provenant des données brutes wikipédia du 1er février 2020</a:t>
-            </a:r>
-            <a:endParaRPr sz="1200">
-              <a:solidFill>
-                <a:srgbClr val="000000"/>
-              </a:solidFill>
-              <a:latin typeface="Arial"/>
-              <a:ea typeface="Arial"/>
-              <a:cs typeface="Arial"/>
-              <a:sym typeface="Arial"/>
-            </a:endParaRPr>
-          </a:p>
-          <a:p>
-            <a:pPr indent="-317500" lvl="0" marL="457200" rtl="0" algn="l">
-              <a:spcBef>
-                <a:spcPts val="0"/>
-              </a:spcBef>
-              <a:spcAft>
-                <a:spcPts val="0"/>
-              </a:spcAft>
-              <a:buSzPts val="1400"/>
-              <a:buChar char="●"/>
-            </a:pPr>
-            <a:r>
-              <a:rPr lang="fr" sz="1200">
-                <a:solidFill>
-                  <a:srgbClr val="6AA84F"/>
-                </a:solidFill>
-                <a:latin typeface="Arial"/>
-                <a:ea typeface="Arial"/>
-                <a:cs typeface="Arial"/>
-                <a:sym typeface="Arial"/>
-              </a:rPr>
-              <a:t>/data/frwiki/frwiki-20200201/master/pagelink.avsc</a:t>
-            </a:r>
-            <a:r>
-              <a:rPr lang="fr" sz="1200">
-                <a:solidFill>
-                  <a:srgbClr val="000000"/>
-                </a:solidFill>
-                <a:latin typeface="Arial"/>
-                <a:ea typeface="Arial"/>
-                <a:cs typeface="Arial"/>
-                <a:sym typeface="Arial"/>
-              </a:rPr>
-              <a:t> : schéma avro utilisé pour sérialiser les liens des pages</a:t>
-            </a:r>
-            <a:endParaRPr sz="1200">
-              <a:solidFill>
-                <a:srgbClr val="000000"/>
-              </a:solidFill>
-              <a:latin typeface="Arial"/>
-              <a:ea typeface="Arial"/>
-              <a:cs typeface="Arial"/>
-              <a:sym typeface="Arial"/>
-            </a:endParaRPr>
-          </a:p>
-          <a:p>
-            <a:pPr indent="-317500" lvl="0" marL="457200" rtl="0" algn="l">
-              <a:spcBef>
-                <a:spcPts val="0"/>
-              </a:spcBef>
-              <a:spcAft>
-                <a:spcPts val="0"/>
-              </a:spcAft>
-              <a:buSzPts val="1400"/>
-              <a:buChar char="●"/>
-            </a:pPr>
-            <a:r>
-              <a:rPr lang="fr" sz="1200">
-                <a:solidFill>
-                  <a:srgbClr val="6AA84F"/>
-                </a:solidFill>
-                <a:latin typeface="Arial"/>
-                <a:ea typeface="Arial"/>
-                <a:cs typeface="Arial"/>
-                <a:sym typeface="Arial"/>
-              </a:rPr>
-              <a:t>/data/frwiki/frwiki-20200201/master/pageshistory.avsc</a:t>
-            </a:r>
-            <a:r>
-              <a:rPr lang="fr" sz="1200">
-                <a:solidFill>
-                  <a:srgbClr val="000000"/>
-                </a:solidFill>
-                <a:latin typeface="Arial"/>
-                <a:ea typeface="Arial"/>
-                <a:cs typeface="Arial"/>
-                <a:sym typeface="Arial"/>
-              </a:rPr>
-              <a:t> : schéma avro utilisé pour sérialiser l’historique et les informations concernant les pages</a:t>
-            </a:r>
-            <a:endParaRPr sz="1200">
-              <a:solidFill>
-                <a:srgbClr val="000000"/>
-              </a:solidFill>
-              <a:latin typeface="Arial"/>
-              <a:ea typeface="Arial"/>
-              <a:cs typeface="Arial"/>
-              <a:sym typeface="Arial"/>
-            </a:endParaRPr>
-          </a:p>
-          <a:p>
-            <a:pPr indent="-317500" lvl="0" marL="457200" rtl="0" algn="l">
-              <a:spcBef>
-                <a:spcPts val="0"/>
-              </a:spcBef>
-              <a:spcAft>
-                <a:spcPts val="0"/>
-              </a:spcAft>
-              <a:buSzPts val="1400"/>
-              <a:buChar char="●"/>
-            </a:pPr>
-            <a:r>
-              <a:rPr b="1" lang="fr" sz="1200">
-                <a:solidFill>
-                  <a:srgbClr val="000000"/>
-                </a:solidFill>
-                <a:latin typeface="Arial"/>
-                <a:ea typeface="Arial"/>
-                <a:cs typeface="Arial"/>
-                <a:sym typeface="Arial"/>
-              </a:rPr>
-              <a:t>/data/frwiki/frwiki-20200201/master/full/</a:t>
-            </a:r>
-            <a:r>
-              <a:rPr lang="fr" sz="1200">
-                <a:solidFill>
-                  <a:srgbClr val="000000"/>
-                </a:solidFill>
-                <a:latin typeface="Arial"/>
-                <a:ea typeface="Arial"/>
-                <a:cs typeface="Arial"/>
-                <a:sym typeface="Arial"/>
-              </a:rPr>
-              <a:t> : contient tous les données sérialisé (complet)</a:t>
-            </a:r>
-            <a:endParaRPr sz="1200">
-              <a:solidFill>
-                <a:srgbClr val="000000"/>
-              </a:solidFill>
-              <a:latin typeface="Arial"/>
-              <a:ea typeface="Arial"/>
-              <a:cs typeface="Arial"/>
-              <a:sym typeface="Arial"/>
-            </a:endParaRPr>
-          </a:p>
-          <a:p>
-            <a:pPr indent="-317500" lvl="0" marL="457200" rtl="0" algn="l">
-              <a:spcBef>
-                <a:spcPts val="0"/>
-              </a:spcBef>
-              <a:spcAft>
-                <a:spcPts val="0"/>
-              </a:spcAft>
-              <a:buSzPts val="1400"/>
-              <a:buChar char="●"/>
-            </a:pPr>
-            <a:r>
-              <a:rPr lang="fr" sz="1200">
-                <a:solidFill>
-                  <a:srgbClr val="6AA84F"/>
-                </a:solidFill>
-                <a:latin typeface="Arial"/>
-                <a:ea typeface="Arial"/>
-                <a:cs typeface="Arial"/>
-                <a:sym typeface="Arial"/>
-              </a:rPr>
-              <a:t>/data/frwiki/frwiki-20200201/master/full/frwiki-20200201-pagelinks-*.avro</a:t>
-            </a:r>
-            <a:r>
-              <a:rPr lang="fr" sz="1200">
-                <a:solidFill>
-                  <a:srgbClr val="000000"/>
-                </a:solidFill>
-                <a:latin typeface="Arial"/>
-                <a:ea typeface="Arial"/>
-                <a:cs typeface="Arial"/>
-                <a:sym typeface="Arial"/>
-              </a:rPr>
-              <a:t>: pages links sérialisés</a:t>
-            </a:r>
-            <a:endParaRPr sz="1200">
-              <a:solidFill>
-                <a:srgbClr val="000000"/>
-              </a:solidFill>
-              <a:latin typeface="Arial"/>
-              <a:ea typeface="Arial"/>
-              <a:cs typeface="Arial"/>
-              <a:sym typeface="Arial"/>
-            </a:endParaRPr>
-          </a:p>
-          <a:p>
-            <a:pPr indent="-317500" lvl="0" marL="457200" rtl="0" algn="l">
-              <a:spcBef>
-                <a:spcPts val="0"/>
-              </a:spcBef>
-              <a:spcAft>
-                <a:spcPts val="0"/>
-              </a:spcAft>
-              <a:buSzPts val="1400"/>
-              <a:buChar char="●"/>
-            </a:pPr>
-            <a:r>
-              <a:rPr lang="fr" sz="1200">
-                <a:solidFill>
-                  <a:srgbClr val="6AA84F"/>
-                </a:solidFill>
-                <a:latin typeface="Arial"/>
-                <a:ea typeface="Arial"/>
-                <a:cs typeface="Arial"/>
-                <a:sym typeface="Arial"/>
-              </a:rPr>
-              <a:t>/data/frwiki/frwiki-20200201/master/full/frwiki-20200201-stub-meta-history-*.avro</a:t>
-            </a:r>
-            <a:r>
-              <a:rPr lang="fr" sz="1200">
-                <a:solidFill>
-                  <a:srgbClr val="000000"/>
-                </a:solidFill>
-                <a:latin typeface="Arial"/>
-                <a:ea typeface="Arial"/>
-                <a:cs typeface="Arial"/>
-                <a:sym typeface="Arial"/>
-              </a:rPr>
-              <a:t> : history sérialisé</a:t>
-            </a:r>
-            <a:endParaRPr sz="1200">
-              <a:solidFill>
-                <a:srgbClr val="000000"/>
-              </a:solidFill>
-              <a:latin typeface="Arial"/>
-              <a:ea typeface="Arial"/>
-              <a:cs typeface="Arial"/>
-              <a:sym typeface="Arial"/>
-            </a:endParaRPr>
-          </a:p>
-          <a:p>
-            <a:pPr indent="-317500" lvl="0" marL="457200" rtl="0" algn="l">
-              <a:spcBef>
-                <a:spcPts val="0"/>
-              </a:spcBef>
-              <a:spcAft>
-                <a:spcPts val="0"/>
-              </a:spcAft>
-              <a:buSzPts val="1400"/>
-              <a:buChar char="●"/>
-            </a:pPr>
-            <a:r>
-              <a:rPr b="1" lang="fr" sz="1200">
-                <a:solidFill>
-                  <a:srgbClr val="000000"/>
-                </a:solidFill>
-                <a:latin typeface="Arial"/>
-                <a:ea typeface="Arial"/>
-                <a:cs typeface="Arial"/>
-                <a:sym typeface="Arial"/>
-              </a:rPr>
-              <a:t>/data/frwiki/frwiki-20200201/master/test/</a:t>
-            </a:r>
-            <a:r>
-              <a:rPr lang="fr" sz="1200">
-                <a:solidFill>
-                  <a:srgbClr val="000000"/>
-                </a:solidFill>
-                <a:latin typeface="Arial"/>
-                <a:ea typeface="Arial"/>
-                <a:cs typeface="Arial"/>
-                <a:sym typeface="Arial"/>
-              </a:rPr>
-              <a:t> : contient des échantillons de jeux de données sérialisés ==&gt; pour faire des tests de traitement ou d’observer des de nos données</a:t>
-            </a:r>
-            <a:endParaRPr sz="1400"/>
-          </a:p>
-          <a:p>
-            <a:pPr indent="0" lvl="0" marL="0" rtl="0" algn="l">
-              <a:spcBef>
-                <a:spcPts val="0"/>
-              </a:spcBef>
-              <a:spcAft>
-                <a:spcPts val="0"/>
-              </a:spcAft>
-              <a:buNone/>
-            </a:pPr>
-            <a:r>
-              <a:rPr lang="fr" sz="1400"/>
-              <a:t> </a:t>
-            </a:r>
-            <a:endParaRPr sz="1400"/>
-          </a:p>
-          <a:p>
-            <a:pPr indent="0" lvl="0" marL="0" rtl="0" algn="l">
-              <a:spcBef>
-                <a:spcPts val="0"/>
-              </a:spcBef>
-              <a:spcAft>
-                <a:spcPts val="0"/>
-              </a:spcAft>
-              <a:buNone/>
-            </a:pPr>
-            <a:r>
-              <a:t/>
-            </a:r>
-            <a:endParaRPr sz="1400"/>
-          </a:p>
-        </p:txBody>
-      </p:sp>
+          <a:noFill/>
+          <a:ln>
+            <a:noFill/>
+          </a:ln>
+        </p:spPr>
+      </p:pic>
     </p:spTree>
   </p:cSld>
   <p:clrMapOvr>
@@ -21868,37 +21223,37 @@
         </p:nvSpPr>
         <p:spPr>
           <a:xfrm>
-            <a:off x="4855675" y="0"/>
-            <a:ext cx="4288200" cy="475500"/>
+            <a:off x="1303800" y="98000"/>
+            <a:ext cx="7030500" cy="565200"/>
           </a:xfrm>
           <a:prstGeom prst="rect">
             <a:avLst/>
           </a:prstGeom>
         </p:spPr>
         <p:txBody>
-          <a:bodyPr anchorCtr="0" anchor="ctr" bIns="91425" lIns="91425" spcFirstLastPara="1" rIns="91425" wrap="square" tIns="91425">
+          <a:bodyPr anchorCtr="0" anchor="t" bIns="91425" lIns="91425" spcFirstLastPara="1" rIns="91425" wrap="square" tIns="91425">
             <a:noAutofit/>
           </a:bodyPr>
           <a:lstStyle/>
           <a:p>
-            <a:pPr indent="457200" lvl="0" marL="0" rtl="0" algn="ctr">
-              <a:spcBef>
-                <a:spcPts val="0"/>
-              </a:spcBef>
-              <a:spcAft>
-                <a:spcPts val="0"/>
-              </a:spcAft>
-              <a:buNone/>
-            </a:pPr>
-            <a:r>
-              <a:rPr lang="fr" sz="2100"/>
-              <a:t>c</a:t>
-            </a:r>
-            <a:r>
-              <a:rPr lang="fr" sz="2100"/>
-              <a:t>) Démarrage kafka-manager:</a:t>
-            </a:r>
-            <a:endParaRPr b="0" sz="1100"/>
+            <a:pPr indent="0" lvl="0" marL="0" rtl="0" algn="l">
+              <a:spcBef>
+                <a:spcPts val="0"/>
+              </a:spcBef>
+              <a:spcAft>
+                <a:spcPts val="0"/>
+              </a:spcAft>
+              <a:buNone/>
+            </a:pPr>
+            <a:r>
+              <a:rPr lang="fr"/>
+              <a:t>a) Flux de donnée: Architecture </a:t>
+            </a:r>
+            <a:r>
+              <a:rPr b="1" lang="fr"/>
+              <a:t>Lambda:</a:t>
+            </a:r>
+            <a:endParaRPr b="1" sz="2000"/>
           </a:p>
         </p:txBody>
       </p:sp>
@@ -21918,8 +21273,8 @@
         </p:blipFill>
         <p:spPr>
           <a:xfrm>
-            <a:off x="0" y="-50075"/>
-            <a:ext cx="5227816" cy="5143501"/>
+            <a:off x="641850" y="725775"/>
+            <a:ext cx="7977824" cy="4230000"/>
           </a:xfrm>
           <a:prstGeom prst="rect">
             <a:avLst/>
@@ -21966,14 +21321,14 @@
         <p:spPr>
           <a:xfrm>
             <a:off x="1303800" y="98000"/>
-            <a:ext cx="7030500" cy="565200"/>
+            <a:ext cx="7030500" cy="339900"/>
           </a:xfrm>
           <a:prstGeom prst="rect">
             <a:avLst/>
           </a:prstGeom>
         </p:spPr>
         <p:txBody>
-          <a:bodyPr anchorCtr="0" anchor="t" bIns="91425" lIns="91425" spcFirstLastPara="1" rIns="91425" wrap="square" tIns="91425">
+          <a:bodyPr anchorCtr="0" anchor="ctr" bIns="91425" lIns="91425" spcFirstLastPara="1" rIns="91425" wrap="square" tIns="91425">
             <a:noAutofit/>
           </a:bodyPr>
           <a:lstStyle/>
@@ -21989,11 +21344,7 @@
             </a:pPr>
             <a:r>
               <a:rPr lang="fr"/>
-              <a:t>a) Flux de donnée: Architecture </a:t>
-            </a:r>
-            <a:r>
-              <a:rPr b="1" lang="fr"/>
-              <a:t>Lambda:</a:t>
+              <a:t>b) Architecture technique:</a:t>
             </a:r>
             <a:endParaRPr b="1" sz="2000"/>
           </a:p>
@@ -22015,8 +21366,8 @@
         </p:blipFill>
         <p:spPr>
           <a:xfrm>
-            <a:off x="641850" y="725775"/>
-            <a:ext cx="7977824" cy="4230000"/>
+            <a:off x="32388" y="613100"/>
+            <a:ext cx="9079224" cy="4072308"/>
           </a:xfrm>
           <a:prstGeom prst="rect">
             <a:avLst/>
@@ -22173,7 +21524,7 @@
             </a:pPr>
             <a:r>
               <a:rPr lang="fr" sz="1700"/>
-              <a:t>Développer une solution complète qui :</a:t>
+              <a:t>Développer une solution de traitement des messages qui :</a:t>
             </a:r>
             <a:endParaRPr sz="1700"/>
           </a:p>
@@ -22205,11 +21556,60 @@
             </a:pPr>
             <a:r>
               <a:rPr lang="fr" sz="1700"/>
-              <a:t>avec l’analyse des hashtags, permettra de créer un tableau de bord affichant le top 10 des mots-clés</a:t>
-            </a:r>
+              <a:t>Origine de nos données API Twitter</a:t>
+            </a:r>
+            <a:endParaRPr sz="1700"/>
+          </a:p>
+          <a:p>
+            <a:pPr indent="0" lvl="0" marL="457200" rtl="0" algn="l">
+              <a:spcBef>
+                <a:spcPts val="0"/>
+              </a:spcBef>
+              <a:spcAft>
+                <a:spcPts val="0"/>
+              </a:spcAft>
+              <a:buNone/>
+            </a:pPr>
+            <a:r>
+              <a:t/>
+            </a:r>
+            <a:endParaRPr sz="1700"/>
+          </a:p>
+          <a:p>
+            <a:pPr indent="-336550" lvl="0" marL="457200" rtl="0" algn="l">
+              <a:spcBef>
+                <a:spcPts val="0"/>
+              </a:spcBef>
+              <a:spcAft>
+                <a:spcPts val="0"/>
+              </a:spcAft>
+              <a:buSzPts val="1700"/>
+              <a:buChar char="●"/>
+            </a:pPr>
             <a:r>
               <a:rPr lang="fr" sz="1700"/>
-              <a:t> les plus tendances sur Twitter:</a:t>
+              <a:t>analysera les hashtags dans les messages postés </a:t>
+            </a:r>
+            <a:endParaRPr sz="1700"/>
+          </a:p>
+          <a:p>
+            <a:pPr indent="-336550" lvl="0" marL="457200" rtl="0" algn="l">
+              <a:spcBef>
+                <a:spcPts val="0"/>
+              </a:spcBef>
+              <a:spcAft>
+                <a:spcPts val="0"/>
+              </a:spcAft>
+              <a:buSzPts val="1700"/>
+              <a:buChar char="●"/>
+            </a:pPr>
+            <a:r>
+              <a:rPr lang="fr" sz="1700"/>
+              <a:t>permettra de visualiser le top 10 des hashtags </a:t>
+            </a:r>
+            <a:r>
+              <a:rPr lang="fr" sz="1700"/>
+              <a:t>les plus tendances sur Twitter:</a:t>
             </a:r>
             <a:endParaRPr sz="1700"/>
           </a:p>
@@ -22243,39 +21643,7 @@
             </a:pPr>
             <a:r>
               <a:rPr lang="fr" sz="1700"/>
-              <a:t>à un instant données, n’importe lequel comme lundi dernier entre 7h à 8h</a:t>
-            </a:r>
-            <a:endParaRPr sz="1700"/>
-          </a:p>
-          <a:p>
-            <a:pPr indent="0" lvl="0" marL="0" rtl="0" algn="l">
-              <a:spcBef>
-                <a:spcPts val="1600"/>
-              </a:spcBef>
-              <a:spcAft>
-                <a:spcPts val="0"/>
-              </a:spcAft>
-              <a:buNone/>
-            </a:pPr>
-            <a:r>
-              <a:t/>
-            </a:r>
-            <a:endParaRPr sz="1700"/>
-          </a:p>
-          <a:p>
-            <a:pPr indent="-336550" lvl="0" marL="457200" rtl="0" algn="l">
-              <a:spcBef>
-                <a:spcPts val="0"/>
-              </a:spcBef>
-              <a:spcAft>
-                <a:spcPts val="0"/>
-              </a:spcAft>
-              <a:buSzPts val="1700"/>
-              <a:buChar char="●"/>
-            </a:pPr>
-            <a:r>
-              <a:rPr lang="fr" sz="1700"/>
-              <a:t>Origine de nos données API Twitter</a:t>
+              <a:t>à un instant données, n’importe quel moment comme lundi dernier entre 7h à 8h</a:t>
             </a:r>
             <a:endParaRPr sz="1700"/>
           </a:p>
@@ -22316,8 +21684,8 @@
         </p:nvSpPr>
         <p:spPr>
           <a:xfrm>
-            <a:off x="1303800" y="98000"/>
-            <a:ext cx="7030500" cy="339900"/>
+            <a:off x="1151675" y="0"/>
+            <a:ext cx="7569000" cy="387900"/>
           </a:xfrm>
           <a:prstGeom prst="rect">
             <a:avLst/>
@@ -22329,7 +21697,7 @@
           </a:bodyPr>
           <a:lstStyle/>
           <a:p>
-            <a:pPr indent="0" lvl="0" marL="0" rtl="0" algn="l">
+            <a:pPr indent="0" lvl="0" marL="457200" rtl="0" algn="l">
               <a:spcBef>
                 <a:spcPts val="0"/>
               </a:spcBef>
@@ -22340,9 +21708,17 @@
             </a:pPr>
             <a:r>
               <a:rPr lang="fr"/>
-              <a:t>b) Architecture technique:</a:t>
-            </a:r>
-            <a:endParaRPr b="1" sz="2000"/>
+              <a:t>b) </a:t>
+            </a:r>
+            <a:r>
+              <a:rPr lang="fr" sz="2000"/>
+              <a:t>P</a:t>
+            </a:r>
+            <a:r>
+              <a:rPr b="0" lang="fr" sz="2000"/>
+              <a:t>résentation des données d’entrées</a:t>
+            </a:r>
+            <a:endParaRPr b="0" sz="2000"/>
           </a:p>
         </p:txBody>
       </p:sp>
@@ -22362,8 +21738,8 @@
         </p:blipFill>
         <p:spPr>
           <a:xfrm>
-            <a:off x="32388" y="613100"/>
-            <a:ext cx="9079224" cy="4072308"/>
+            <a:off x="89825" y="450425"/>
+            <a:ext cx="7247956" cy="4693076"/>
           </a:xfrm>
           <a:prstGeom prst="rect">
             <a:avLst/>
@@ -22409,8 +21785,8 @@
         </p:nvSpPr>
         <p:spPr>
           <a:xfrm>
-            <a:off x="1151675" y="0"/>
-            <a:ext cx="7569000" cy="387900"/>
+            <a:off x="0" y="0"/>
+            <a:ext cx="2887200" cy="1275900"/>
           </a:xfrm>
           <a:prstGeom prst="rect">
             <a:avLst/>
@@ -22422,7 +21798,7 @@
           </a:bodyPr>
           <a:lstStyle/>
           <a:p>
-            <a:pPr indent="0" lvl="0" marL="457200" rtl="0" algn="l">
+            <a:pPr indent="0" lvl="0" marL="0" rtl="0" algn="l">
               <a:spcBef>
                 <a:spcPts val="0"/>
               </a:spcBef>
@@ -22441,7 +21817,23 @@
             </a:r>
             <a:r>
               <a:rPr b="0" lang="fr" sz="2000"/>
-              <a:t>résentation des données d’entrées</a:t>
+              <a:t>résentation des </a:t>
+            </a:r>
+            <a:endParaRPr b="0" sz="2000"/>
+          </a:p>
+          <a:p>
+            <a:pPr indent="0" lvl="0" marL="0" rtl="0" algn="l">
+              <a:spcBef>
+                <a:spcPts val="0"/>
+              </a:spcBef>
+              <a:spcAft>
+                <a:spcPts val="0"/>
+              </a:spcAft>
+              <a:buNone/>
+            </a:pPr>
+            <a:r>
+              <a:rPr b="0" lang="fr" sz="2000"/>
+              <a:t>données d’entrées:</a:t>
             </a:r>
             <a:endParaRPr b="0" sz="2000"/>
           </a:p>
@@ -22463,8 +21855,8 @@
         </p:blipFill>
         <p:spPr>
           <a:xfrm>
-            <a:off x="89825" y="450425"/>
-            <a:ext cx="7247956" cy="4693076"/>
+            <a:off x="3688625" y="26850"/>
+            <a:ext cx="5388224" cy="5089776"/>
           </a:xfrm>
           <a:prstGeom prst="rect">
             <a:avLst/>
@@ -22579,11 +21971,11 @@
             </a:pPr>
             <a:r>
               <a:rPr lang="fr" sz="1700"/>
-              <a:t>S</a:t>
+              <a:t>L</a:t>
             </a:r>
             <a:r>
               <a:rPr lang="fr" sz="1700"/>
-              <a:t>i besoins, la solution permettra de recalculer les tendances à un instant donné:</a:t>
+              <a:t>a solution proposée peut recalculer les tendances à un instant donné:</a:t>
             </a:r>
             <a:endParaRPr sz="1700"/>
           </a:p>
@@ -22600,11 +21992,7 @@
             </a:pPr>
             <a:r>
               <a:rPr lang="fr" sz="1700"/>
-              <a:t>Solution de stockage : prendre toutes les précautions nécessaires pour s</a:t>
-            </a:r>
-            <a:r>
-              <a:rPr lang="fr" sz="1700"/>
-              <a:t>écuriser nos données: ex: contre fausse manipulation ou piratage</a:t>
+              <a:t>Prévoir une solution de stockage dans l’architecture: HDFS</a:t>
             </a:r>
             <a:endParaRPr sz="1700"/>
           </a:p>
@@ -22621,7 +22009,11 @@
             </a:pPr>
             <a:r>
               <a:rPr lang="fr" sz="1700"/>
-              <a:t>Calcul</a:t>
+              <a:t>Scalable dans le sens où c</a:t>
+            </a:r>
+            <a:r>
+              <a:rPr lang="fr" sz="1700"/>
+              <a:t>alcul</a:t>
             </a:r>
             <a:r>
               <a:rPr lang="fr" sz="1700"/>
@@ -22709,7 +22101,7 @@
             </a:r>
             <a:r>
               <a:rPr lang="fr" sz="1700"/>
-              <a:t>): Speed-view avec speed layer</a:t>
+              <a:t>): Speed-view et speed layer</a:t>
             </a:r>
             <a:endParaRPr sz="1700"/>
           </a:p>
@@ -23097,6 +22489,285 @@
 </file>
 
 <file path=ppt/theme/theme1.xml><?xml version="1.0" encoding="utf-8"?>
+<a:theme xmlns:a="http://schemas.openxmlformats.org/drawingml/2006/main" xmlns:r="http://schemas.openxmlformats.org/officeDocument/2006/relationships">
+  <a:themeElements>
+    <a:clrScheme name="Default">
+      <a:dk1>
+        <a:srgbClr val="000000"/>
+      </a:dk1>
+      <a:lt1>
+        <a:srgbClr val="FFFFFF"/>
+      </a:lt1>
+      <a:dk2>
+        <a:srgbClr val="158158"/>
+      </a:dk2>
+      <a:lt2>
+        <a:srgbClr val="F3F3F3"/>
+      </a:lt2>
+      <a:accent1>
+        <a:srgbClr val="058DC7"/>
+      </a:accent1>
+      <a:accent2>
+        <a:srgbClr val="50B432"/>
+      </a:accent2>
+      <a:accent3>
+        <a:srgbClr val="ED561B"/>
+      </a:accent3>
+      <a:accent4>
+        <a:srgbClr val="EDEF00"/>
+      </a:accent4>
+      <a:accent5>
+        <a:srgbClr val="24CBE5"/>
+      </a:accent5>
+      <a:accent6>
+        <a:srgbClr val="64E572"/>
+      </a:accent6>
+      <a:hlink>
+        <a:srgbClr val="2200CC"/>
+      </a:hlink>
+      <a:folHlink>
+        <a:srgbClr val="551A8B"/>
+      </a:folHlink>
+    </a:clrScheme>
+    <a:fontScheme name="Office">
+      <a:majorFont>
+        <a:latin typeface="Arial"/>
+        <a:ea typeface=""/>
+        <a:cs typeface=""/>
+        <a:font script="Jpan" typeface="ＭＳ Ｐゴシック"/>
+        <a:font script="Hang" typeface="맑은 고딕"/>
+        <a:font script="Hans" typeface="宋体"/>
+        <a:font script="Hant" typeface="新細明體"/>
+        <a:font script="Arab" typeface="Times New Roman"/>
+        <a:font script="Hebr" typeface="Times New Roman"/>
+        <a:font script="Thai" typeface="Angsana New"/>
+        <a:font script="Ethi" typeface="Nyala"/>
+        <a:font script="Beng" typeface="Vrinda"/>
+        <a:font script="Gujr" typeface="Shruti"/>
+        <a:font script="Khmr" typeface="MoolBoran"/>
+        <a:font script="Knda" typeface="Tunga"/>
+        <a:font script="Guru" typeface="Raavi"/>
+        <a:font script="Cans" typeface="Euphemia"/>
+        <a:font script="Cher" typeface="Plantagenet Cherokee"/>
+        <a:font script="Yiii" typeface="Microsoft Yi Baiti"/>
+        <a:font script="Tibt" typeface="Microsoft Himalaya"/>
+        <a:font script="Thaa" typeface="MV Boli"/>
+        <a:font script="Deva" typeface="Mangal"/>
+        <a:font script="Telu" typeface="Gautami"/>
+        <a:font script="Taml" typeface="Latha"/>
+        <a:font script="Syrc" typeface="Estrangelo Edessa"/>
+        <a:font script="Orya" typeface="Kalinga"/>
+        <a:font script="Mlym" typeface="Kartika"/>
+        <a:font script="Laoo" typeface="DokChampa"/>
+        <a:font script="Sinh" typeface="Iskoola Pota"/>
+        <a:font script="Mong" typeface="Mongolian Baiti"/>
+        <a:font script="Viet" typeface="Times New Roman"/>
+        <a:font script="Uigh" typeface="Microsoft Uighur"/>
+        <a:font script="Geor" typeface="Sylfaen"/>
+      </a:majorFont>
+      <a:minorFont>
+        <a:latin typeface="Arial"/>
+        <a:ea typeface=""/>
+        <a:cs typeface=""/>
+        <a:font script="Jpan" typeface="ＭＳ Ｐゴシック"/>
+        <a:font script="Hang" typeface="맑은 고딕"/>
+        <a:font script="Hans" typeface="宋体"/>
+        <a:font script="Hant" typeface="新細明體"/>
+        <a:font script="Arab" typeface="Arial"/>
+        <a:font script="Hebr" typeface="Arial"/>
+        <a:font script="Thai" typeface="Cordia New"/>
+        <a:font script="Ethi" typeface="Nyala"/>
+        <a:font script="Beng" typeface="Vrinda"/>
+        <a:font script="Gujr" typeface="Shruti"/>
+        <a:font script="Khmr" typeface="DaunPenh"/>
+        <a:font script="Knda" typeface="Tunga"/>
+        <a:font script="Guru" typeface="Raavi"/>
+        <a:font script="Cans" typeface="Euphemia"/>
+        <a:font script="Cher" typeface="Plantagenet Cherokee"/>
+        <a:font script="Yiii" typeface="Microsoft Yi Baiti"/>
+        <a:font script="Tibt" typeface="Microsoft Himalaya"/>
+        <a:font script="Thaa" typeface="MV Boli"/>
+        <a:font script="Deva" typeface="Mangal"/>
+        <a:font script="Telu" typeface="Gautami"/>
+        <a:font script="Taml" typeface="Latha"/>
+        <a:font script="Syrc" typeface="Estrangelo Edessa"/>
+        <a:font script="Orya" typeface="Kalinga"/>
+        <a:font script="Mlym" typeface="Kartika"/>
+        <a:font script="Laoo" typeface="DokChampa"/>
+        <a:font script="Sinh" typeface="Iskoola Pota"/>
+        <a:font script="Mong" typeface="Mongolian Baiti"/>
+        <a:font script="Viet" typeface="Arial"/>
+        <a:font script="Uigh" typeface="Microsoft Uighur"/>
+        <a:font script="Geor" typeface="Sylfaen"/>
+      </a:minorFont>
+    </a:fontScheme>
+    <a:fmtScheme name="Office">
+      <a:fillStyleLst>
+        <a:solidFill>
+          <a:schemeClr val="phClr"/>
+        </a:solidFill>
+        <a:gradFill rotWithShape="1">
+          <a:gsLst>
+            <a:gs pos="0">
+              <a:schemeClr val="phClr">
+                <a:tint val="50000"/>
+                <a:satMod val="300000"/>
+              </a:schemeClr>
+            </a:gs>
+            <a:gs pos="35000">
+              <a:schemeClr val="phClr">
+                <a:tint val="37000"/>
+                <a:satMod val="300000"/>
+              </a:schemeClr>
+            </a:gs>
+            <a:gs pos="100000">
+              <a:schemeClr val="phClr">
+                <a:tint val="15000"/>
+                <a:satMod val="350000"/>
+              </a:schemeClr>
+            </a:gs>
+          </a:gsLst>
+          <a:lin ang="16200000" scaled="1"/>
+        </a:gradFill>
+        <a:gradFill rotWithShape="1">
+          <a:gsLst>
+            <a:gs pos="0">
+              <a:schemeClr val="phClr">
+                <a:tint val="100000"/>
+                <a:shade val="100000"/>
+                <a:satMod val="130000"/>
+              </a:schemeClr>
+            </a:gs>
+            <a:gs pos="100000">
+              <a:schemeClr val="phClr">
+                <a:tint val="50000"/>
+                <a:shade val="100000"/>
+                <a:satMod val="350000"/>
+              </a:schemeClr>
+            </a:gs>
+          </a:gsLst>
+          <a:lin ang="16200000" scaled="0"/>
+        </a:gradFill>
+      </a:fillStyleLst>
+      <a:lnStyleLst>
+        <a:ln w="9525" cap="flat" cmpd="sng" algn="ctr">
+          <a:solidFill>
+            <a:schemeClr val="phClr">
+              <a:shade val="95000"/>
+              <a:satMod val="105000"/>
+            </a:schemeClr>
+          </a:solidFill>
+          <a:prstDash val="solid"/>
+        </a:ln>
+        <a:ln w="25400" cap="flat" cmpd="sng" algn="ctr">
+          <a:solidFill>
+            <a:schemeClr val="phClr"/>
+          </a:solidFill>
+          <a:prstDash val="solid"/>
+        </a:ln>
+        <a:ln w="38100" cap="flat" cmpd="sng" algn="ctr">
+          <a:solidFill>
+            <a:schemeClr val="phClr"/>
+          </a:solidFill>
+          <a:prstDash val="solid"/>
+        </a:ln>
+      </a:lnStyleLst>
+      <a:effectStyleLst>
+        <a:effectStyle>
+          <a:effectLst>
+            <a:outerShdw blurRad="40000" dist="20000" dir="5400000" rotWithShape="0">
+              <a:srgbClr val="000000">
+                <a:alpha val="38000"/>
+              </a:srgbClr>
+            </a:outerShdw>
+          </a:effectLst>
+        </a:effectStyle>
+        <a:effectStyle>
+          <a:effectLst>
+            <a:outerShdw blurRad="40000" dist="23000" dir="5400000" rotWithShape="0">
+              <a:srgbClr val="000000">
+                <a:alpha val="35000"/>
+              </a:srgbClr>
+            </a:outerShdw>
+          </a:effectLst>
+        </a:effectStyle>
+        <a:effectStyle>
+          <a:effectLst>
+            <a:outerShdw blurRad="40000" dist="23000" dir="5400000" rotWithShape="0">
+              <a:srgbClr val="000000">
+                <a:alpha val="35000"/>
+              </a:srgbClr>
+            </a:outerShdw>
+          </a:effectLst>
+          <a:scene3d>
+            <a:camera prst="orthographicFront">
+              <a:rot lat="0" lon="0" rev="0"/>
+            </a:camera>
+            <a:lightRig rig="threePt" dir="t">
+              <a:rot lat="0" lon="0" rev="1200000"/>
+            </a:lightRig>
+          </a:scene3d>
+          <a:sp3d>
+            <a:bevelT w="63500" h="25400"/>
+          </a:sp3d>
+        </a:effectStyle>
+      </a:effectStyleLst>
+      <a:bgFillStyleLst>
+        <a:solidFill>
+          <a:schemeClr val="phClr"/>
+        </a:solidFill>
+        <a:gradFill rotWithShape="1">
+          <a:gsLst>
+            <a:gs pos="0">
+              <a:schemeClr val="phClr">
+                <a:tint val="40000"/>
+                <a:satMod val="350000"/>
+              </a:schemeClr>
+            </a:gs>
+            <a:gs pos="40000">
+              <a:schemeClr val="phClr">
+                <a:tint val="45000"/>
+                <a:shade val="99000"/>
+                <a:satMod val="350000"/>
+              </a:schemeClr>
+            </a:gs>
+            <a:gs pos="100000">
+              <a:schemeClr val="phClr">
+                <a:shade val="20000"/>
+                <a:satMod val="255000"/>
+              </a:schemeClr>
+            </a:gs>
+          </a:gsLst>
+          <a:path path="circle">
+            <a:fillToRect l="50000" t="-80000" r="50000" b="180000"/>
+          </a:path>
+        </a:gradFill>
+        <a:gradFill rotWithShape="1">
+          <a:gsLst>
+            <a:gs pos="0">
+              <a:schemeClr val="phClr">
+                <a:tint val="80000"/>
+                <a:satMod val="300000"/>
+              </a:schemeClr>
+            </a:gs>
+            <a:gs pos="100000">
+              <a:schemeClr val="phClr">
+                <a:shade val="30000"/>
+                <a:satMod val="200000"/>
+              </a:schemeClr>
+            </a:gs>
+          </a:gsLst>
+          <a:path path="circle">
+            <a:fillToRect l="50000" t="50000" r="50000" b="50000"/>
+          </a:path>
+        </a:gradFill>
+      </a:bgFillStyleLst>
+    </a:fmtScheme>
+  </a:themeElements>
+</a:theme>
+</file>
+
+<file path=ppt/theme/theme2.xml><?xml version="1.0" encoding="utf-8"?>
 <a:theme xmlns:a="http://schemas.openxmlformats.org/drawingml/2006/main" xmlns:r="http://schemas.openxmlformats.org/officeDocument/2006/relationships" name="Geometric">
   <a:themeElements>
     <a:clrScheme name="Geometric">
@@ -23373,283 +23044,4 @@
     </a:fmtScheme>
   </a:themeElements>
 </a:theme>
-</file>
-
-<file path=ppt/theme/theme2.xml><?xml version="1.0" encoding="utf-8"?>
-<a:theme xmlns:a="http://schemas.openxmlformats.org/drawingml/2006/main" xmlns:r="http://schemas.openxmlformats.org/officeDocument/2006/relationships">
-  <a:themeElements>
-    <a:clrScheme name="Default">
-      <a:dk1>
-        <a:srgbClr val="000000"/>
-      </a:dk1>
-      <a:lt1>
-        <a:srgbClr val="FFFFFF"/>
-      </a:lt1>
-      <a:dk2>
-        <a:srgbClr val="158158"/>
-      </a:dk2>
-      <a:lt2>
-        <a:srgbClr val="F3F3F3"/>
-      </a:lt2>
-      <a:accent1>
-        <a:srgbClr val="058DC7"/>
-      </a:accent1>
-      <a:accent2>
-        <a:srgbClr val="50B432"/>
-      </a:accent2>
-      <a:accent3>
-        <a:srgbClr val="ED561B"/>
-      </a:accent3>
-      <a:accent4>
-        <a:srgbClr val="EDEF00"/>
-      </a:accent4>
-      <a:accent5>
-        <a:srgbClr val="24CBE5"/>
-      </a:accent5>
-      <a:accent6>
-        <a:srgbClr val="64E572"/>
-      </a:accent6>
-      <a:hlink>
-        <a:srgbClr val="2200CC"/>
-      </a:hlink>
-      <a:folHlink>
-        <a:srgbClr val="551A8B"/>
-      </a:folHlink>
-    </a:clrScheme>
-    <a:fontScheme name="Office">
-      <a:majorFont>
-        <a:latin typeface="Arial"/>
-        <a:ea typeface=""/>
-        <a:cs typeface=""/>
-        <a:font script="Jpan" typeface="ＭＳ Ｐゴシック"/>
-        <a:font script="Hang" typeface="맑은 고딕"/>
-        <a:font script="Hans" typeface="宋体"/>
-        <a:font script="Hant" typeface="新細明體"/>
-        <a:font script="Arab" typeface="Times New Roman"/>
-        <a:font script="Hebr" typeface="Times New Roman"/>
-        <a:font script="Thai" typeface="Angsana New"/>
-        <a:font script="Ethi" typeface="Nyala"/>
-        <a:font script="Beng" typeface="Vrinda"/>
-        <a:font script="Gujr" typeface="Shruti"/>
-        <a:font script="Khmr" typeface="MoolBoran"/>
-        <a:font script="Knda" typeface="Tunga"/>
-        <a:font script="Guru" typeface="Raavi"/>
-        <a:font script="Cans" typeface="Euphemia"/>
-        <a:font script="Cher" typeface="Plantagenet Cherokee"/>
-        <a:font script="Yiii" typeface="Microsoft Yi Baiti"/>
-        <a:font script="Tibt" typeface="Microsoft Himalaya"/>
-        <a:font script="Thaa" typeface="MV Boli"/>
-        <a:font script="Deva" typeface="Mangal"/>
-        <a:font script="Telu" typeface="Gautami"/>
-        <a:font script="Taml" typeface="Latha"/>
-        <a:font script="Syrc" typeface="Estrangelo Edessa"/>
-        <a:font script="Orya" typeface="Kalinga"/>
-        <a:font script="Mlym" typeface="Kartika"/>
-        <a:font script="Laoo" typeface="DokChampa"/>
-        <a:font script="Sinh" typeface="Iskoola Pota"/>
-        <a:font script="Mong" typeface="Mongolian Baiti"/>
-        <a:font script="Viet" typeface="Times New Roman"/>
-        <a:font script="Uigh" typeface="Microsoft Uighur"/>
-        <a:font script="Geor" typeface="Sylfaen"/>
-      </a:majorFont>
-      <a:minorFont>
-        <a:latin typeface="Arial"/>
-        <a:ea typeface=""/>
-        <a:cs typeface=""/>
-        <a:font script="Jpan" typeface="ＭＳ Ｐゴシック"/>
-        <a:font script="Hang" typeface="맑은 고딕"/>
-        <a:font script="Hans" typeface="宋体"/>
-        <a:font script="Hant" typeface="新細明體"/>
-        <a:font script="Arab" typeface="Arial"/>
-        <a:font script="Hebr" typeface="Arial"/>
-        <a:font script="Thai" typeface="Cordia New"/>
-        <a:font script="Ethi" typeface="Nyala"/>
-        <a:font script="Beng" typeface="Vrinda"/>
-        <a:font script="Gujr" typeface="Shruti"/>
-        <a:font script="Khmr" typeface="DaunPenh"/>
-        <a:font script="Knda" typeface="Tunga"/>
-        <a:font script="Guru" typeface="Raavi"/>
-        <a:font script="Cans" typeface="Euphemia"/>
-        <a:font script="Cher" typeface="Plantagenet Cherokee"/>
-        <a:font script="Yiii" typeface="Microsoft Yi Baiti"/>
-        <a:font script="Tibt" typeface="Microsoft Himalaya"/>
-        <a:font script="Thaa" typeface="MV Boli"/>
-        <a:font script="Deva" typeface="Mangal"/>
-        <a:font script="Telu" typeface="Gautami"/>
-        <a:font script="Taml" typeface="Latha"/>
-        <a:font script="Syrc" typeface="Estrangelo Edessa"/>
-        <a:font script="Orya" typeface="Kalinga"/>
-        <a:font script="Mlym" typeface="Kartika"/>
-        <a:font script="Laoo" typeface="DokChampa"/>
-        <a:font script="Sinh" typeface="Iskoola Pota"/>
-        <a:font script="Mong" typeface="Mongolian Baiti"/>
-        <a:font script="Viet" typeface="Arial"/>
-        <a:font script="Uigh" typeface="Microsoft Uighur"/>
-        <a:font script="Geor" typeface="Sylfaen"/>
-      </a:minorFont>
-    </a:fontScheme>
-    <a:fmtScheme name="Office">
-      <a:fillStyleLst>
-        <a:solidFill>
-          <a:schemeClr val="phClr"/>
-        </a:solidFill>
-        <a:gradFill rotWithShape="1">
-          <a:gsLst>
-            <a:gs pos="0">
-              <a:schemeClr val="phClr">
-                <a:tint val="50000"/>
-                <a:satMod val="300000"/>
-              </a:schemeClr>
-            </a:gs>
-            <a:gs pos="35000">
-              <a:schemeClr val="phClr">
-                <a:tint val="37000"/>
-                <a:satMod val="300000"/>
-              </a:schemeClr>
-            </a:gs>
-            <a:gs pos="100000">
-              <a:schemeClr val="phClr">
-                <a:tint val="15000"/>
-                <a:satMod val="350000"/>
-              </a:schemeClr>
-            </a:gs>
-          </a:gsLst>
-          <a:lin ang="16200000" scaled="1"/>
-        </a:gradFill>
-        <a:gradFill rotWithShape="1">
-          <a:gsLst>
-            <a:gs pos="0">
-              <a:schemeClr val="phClr">
-                <a:tint val="100000"/>
-                <a:shade val="100000"/>
-                <a:satMod val="130000"/>
-              </a:schemeClr>
-            </a:gs>
-            <a:gs pos="100000">
-              <a:schemeClr val="phClr">
-                <a:tint val="50000"/>
-                <a:shade val="100000"/>
-                <a:satMod val="350000"/>
-              </a:schemeClr>
-            </a:gs>
-          </a:gsLst>
-          <a:lin ang="16200000" scaled="0"/>
-        </a:gradFill>
-      </a:fillStyleLst>
-      <a:lnStyleLst>
-        <a:ln w="9525" cap="flat" cmpd="sng" algn="ctr">
-          <a:solidFill>
-            <a:schemeClr val="phClr">
-              <a:shade val="95000"/>
-              <a:satMod val="105000"/>
-            </a:schemeClr>
-          </a:solidFill>
-          <a:prstDash val="solid"/>
-        </a:ln>
-        <a:ln w="25400" cap="flat" cmpd="sng" algn="ctr">
-          <a:solidFill>
-            <a:schemeClr val="phClr"/>
-          </a:solidFill>
-          <a:prstDash val="solid"/>
-        </a:ln>
-        <a:ln w="38100" cap="flat" cmpd="sng" algn="ctr">
-          <a:solidFill>
-            <a:schemeClr val="phClr"/>
-          </a:solidFill>
-          <a:prstDash val="solid"/>
-        </a:ln>
-      </a:lnStyleLst>
-      <a:effectStyleLst>
-        <a:effectStyle>
-          <a:effectLst>
-            <a:outerShdw blurRad="40000" dist="20000" dir="5400000" rotWithShape="0">
-              <a:srgbClr val="000000">
-                <a:alpha val="38000"/>
-              </a:srgbClr>
-            </a:outerShdw>
-          </a:effectLst>
-        </a:effectStyle>
-        <a:effectStyle>
-          <a:effectLst>
-            <a:outerShdw blurRad="40000" dist="23000" dir="5400000" rotWithShape="0">
-              <a:srgbClr val="000000">
-                <a:alpha val="35000"/>
-              </a:srgbClr>
-            </a:outerShdw>
-          </a:effectLst>
-        </a:effectStyle>
-        <a:effectStyle>
-          <a:effectLst>
-            <a:outerShdw blurRad="40000" dist="23000" dir="5400000" rotWithShape="0">
-              <a:srgbClr val="000000">
-                <a:alpha val="35000"/>
-              </a:srgbClr>
-            </a:outerShdw>
-          </a:effectLst>
-          <a:scene3d>
-            <a:camera prst="orthographicFront">
-              <a:rot lat="0" lon="0" rev="0"/>
-            </a:camera>
-            <a:lightRig rig="threePt" dir="t">
-              <a:rot lat="0" lon="0" rev="1200000"/>
-            </a:lightRig>
-          </a:scene3d>
-          <a:sp3d>
-            <a:bevelT w="63500" h="25400"/>
-          </a:sp3d>
-        </a:effectStyle>
-      </a:effectStyleLst>
-      <a:bgFillStyleLst>
-        <a:solidFill>
-          <a:schemeClr val="phClr"/>
-        </a:solidFill>
-        <a:gradFill rotWithShape="1">
-          <a:gsLst>
-            <a:gs pos="0">
-              <a:schemeClr val="phClr">
-                <a:tint val="40000"/>
-                <a:satMod val="350000"/>
-              </a:schemeClr>
-            </a:gs>
-            <a:gs pos="40000">
-              <a:schemeClr val="phClr">
-                <a:tint val="45000"/>
-                <a:shade val="99000"/>
-                <a:satMod val="350000"/>
-              </a:schemeClr>
-            </a:gs>
-            <a:gs pos="100000">
-              <a:schemeClr val="phClr">
-                <a:shade val="20000"/>
-                <a:satMod val="255000"/>
-              </a:schemeClr>
-            </a:gs>
-          </a:gsLst>
-          <a:path path="circle">
-            <a:fillToRect l="50000" t="-80000" r="50000" b="180000"/>
-          </a:path>
-        </a:gradFill>
-        <a:gradFill rotWithShape="1">
-          <a:gsLst>
-            <a:gs pos="0">
-              <a:schemeClr val="phClr">
-                <a:tint val="80000"/>
-                <a:satMod val="300000"/>
-              </a:schemeClr>
-            </a:gs>
-            <a:gs pos="100000">
-              <a:schemeClr val="phClr">
-                <a:shade val="30000"/>
-                <a:satMod val="200000"/>
-              </a:schemeClr>
-            </a:gs>
-          </a:gsLst>
-          <a:path path="circle">
-            <a:fillToRect l="50000" t="50000" r="50000" b="50000"/>
-          </a:path>
-        </a:gradFill>
-      </a:bgFillStyleLst>
-    </a:fmtScheme>
-  </a:themeElements>
-</a:theme>
 </file>
</xml_diff>